<commit_message>
Complete Project Note S2
</commit_message>
<xml_diff>
--- a/Documents/Presentation - Project Note Sprint 2.pptx
+++ b/Documents/Presentation - Project Note Sprint 2.pptx
@@ -6,7 +6,7 @@
     <p:sldMasterId id="2147483660" r:id="rId2"/>
   </p:sldMasterIdLst>
   <p:notesMasterIdLst>
-    <p:notesMasterId r:id="rId20"/>
+    <p:notesMasterId r:id="rId23"/>
   </p:notesMasterIdLst>
   <p:sldIdLst>
     <p:sldId id="256" r:id="rId3"/>
@@ -19,13 +19,16 @@
     <p:sldId id="265" r:id="rId10"/>
     <p:sldId id="266" r:id="rId11"/>
     <p:sldId id="267" r:id="rId12"/>
-    <p:sldId id="268" r:id="rId13"/>
-    <p:sldId id="269" r:id="rId14"/>
-    <p:sldId id="261" r:id="rId15"/>
-    <p:sldId id="270" r:id="rId16"/>
-    <p:sldId id="271" r:id="rId17"/>
+    <p:sldId id="269" r:id="rId13"/>
+    <p:sldId id="276" r:id="rId14"/>
+    <p:sldId id="277" r:id="rId15"/>
+    <p:sldId id="261" r:id="rId16"/>
+    <p:sldId id="270" r:id="rId17"/>
     <p:sldId id="272" r:id="rId18"/>
-    <p:sldId id="260" r:id="rId19"/>
+    <p:sldId id="274" r:id="rId19"/>
+    <p:sldId id="278" r:id="rId20"/>
+    <p:sldId id="273" r:id="rId21"/>
+    <p:sldId id="260" r:id="rId22"/>
   </p:sldIdLst>
   <p:sldSz cx="12192000" cy="6858000"/>
   <p:notesSz cx="6858000" cy="9144000"/>
@@ -124,6 +127,11 @@
       </a:defRPr>
     </a:lvl9pPr>
   </p:defaultTextStyle>
+  <p:extLst>
+    <p:ext uri="{EFAFB233-063F-42B5-8137-9DF3F51BA10A}">
+      <p15:sldGuideLst xmlns:p15="http://schemas.microsoft.com/office/powerpoint/2012/main"/>
+    </p:ext>
+  </p:extLst>
 </p:presentation>
 </file>
 
@@ -1417,13 +1425,13 @@
   <p:clrMapOvr>
     <a:masterClrMapping/>
   </p:clrMapOvr>
-  <mc:AlternateContent xmlns:mc="http://schemas.openxmlformats.org/markup-compatibility/2006">
-    <mc:Choice xmlns:p14="http://schemas.microsoft.com/office/powerpoint/2010/main" Requires="p14">
+  <mc:AlternateContent xmlns:mc="http://schemas.openxmlformats.org/markup-compatibility/2006" xmlns:p14="http://schemas.microsoft.com/office/powerpoint/2010/main">
+    <mc:Choice Requires="p14">
       <p:transition spd="med" p14:dur="700">
         <p:fade/>
       </p:transition>
     </mc:Choice>
-    <mc:Fallback>
+    <mc:Fallback xmlns="">
       <p:transition spd="med">
         <p:fade/>
       </p:transition>
@@ -1628,13 +1636,13 @@
   <p:clrMapOvr>
     <a:masterClrMapping/>
   </p:clrMapOvr>
-  <mc:AlternateContent xmlns:mc="http://schemas.openxmlformats.org/markup-compatibility/2006">
-    <mc:Choice xmlns:p14="http://schemas.microsoft.com/office/powerpoint/2010/main" Requires="p14">
+  <mc:AlternateContent xmlns:mc="http://schemas.openxmlformats.org/markup-compatibility/2006" xmlns:p14="http://schemas.microsoft.com/office/powerpoint/2010/main">
+    <mc:Choice Requires="p14">
       <p:transition spd="med" p14:dur="700">
         <p:fade/>
       </p:transition>
     </mc:Choice>
-    <mc:Fallback>
+    <mc:Fallback xmlns="">
       <p:transition spd="med">
         <p:fade/>
       </p:transition>
@@ -1923,13 +1931,13 @@
   <p:clrMapOvr>
     <a:masterClrMapping/>
   </p:clrMapOvr>
-  <mc:AlternateContent xmlns:mc="http://schemas.openxmlformats.org/markup-compatibility/2006">
-    <mc:Choice xmlns:p14="http://schemas.microsoft.com/office/powerpoint/2010/main" Requires="p14">
+  <mc:AlternateContent xmlns:mc="http://schemas.openxmlformats.org/markup-compatibility/2006" xmlns:p14="http://schemas.microsoft.com/office/powerpoint/2010/main">
+    <mc:Choice Requires="p14">
       <p:transition spd="med" p14:dur="700">
         <p:fade/>
       </p:transition>
     </mc:Choice>
-    <mc:Fallback>
+    <mc:Fallback xmlns="">
       <p:transition spd="med">
         <p:fade/>
       </p:transition>
@@ -2256,13 +2264,13 @@
   <p:clrMapOvr>
     <a:masterClrMapping/>
   </p:clrMapOvr>
-  <mc:AlternateContent xmlns:mc="http://schemas.openxmlformats.org/markup-compatibility/2006">
-    <mc:Choice xmlns:p14="http://schemas.microsoft.com/office/powerpoint/2010/main" Requires="p14">
+  <mc:AlternateContent xmlns:mc="http://schemas.openxmlformats.org/markup-compatibility/2006" xmlns:p14="http://schemas.microsoft.com/office/powerpoint/2010/main">
+    <mc:Choice Requires="p14">
       <p:transition spd="med" p14:dur="700">
         <p:fade/>
       </p:transition>
     </mc:Choice>
-    <mc:Fallback>
+    <mc:Fallback xmlns="">
       <p:transition spd="med">
         <p:fade/>
       </p:transition>
@@ -2738,13 +2746,13 @@
   <p:clrMapOvr>
     <a:masterClrMapping/>
   </p:clrMapOvr>
-  <mc:AlternateContent xmlns:mc="http://schemas.openxmlformats.org/markup-compatibility/2006">
-    <mc:Choice xmlns:p14="http://schemas.microsoft.com/office/powerpoint/2010/main" Requires="p14">
+  <mc:AlternateContent xmlns:mc="http://schemas.openxmlformats.org/markup-compatibility/2006" xmlns:p14="http://schemas.microsoft.com/office/powerpoint/2010/main">
+    <mc:Choice Requires="p14">
       <p:transition spd="med" p14:dur="700">
         <p:fade/>
       </p:transition>
     </mc:Choice>
-    <mc:Fallback>
+    <mc:Fallback xmlns="">
       <p:transition spd="med">
         <p:fade/>
       </p:transition>
@@ -2897,13 +2905,13 @@
   <p:clrMapOvr>
     <a:masterClrMapping/>
   </p:clrMapOvr>
-  <mc:AlternateContent xmlns:mc="http://schemas.openxmlformats.org/markup-compatibility/2006">
-    <mc:Choice xmlns:p14="http://schemas.microsoft.com/office/powerpoint/2010/main" Requires="p14">
+  <mc:AlternateContent xmlns:mc="http://schemas.openxmlformats.org/markup-compatibility/2006" xmlns:p14="http://schemas.microsoft.com/office/powerpoint/2010/main">
+    <mc:Choice Requires="p14">
       <p:transition spd="med" p14:dur="700">
         <p:fade/>
       </p:transition>
     </mc:Choice>
-    <mc:Fallback>
+    <mc:Fallback xmlns="">
       <p:transition spd="med">
         <p:fade/>
       </p:transition>
@@ -3033,13 +3041,13 @@
   <p:clrMapOvr>
     <a:masterClrMapping/>
   </p:clrMapOvr>
-  <mc:AlternateContent xmlns:mc="http://schemas.openxmlformats.org/markup-compatibility/2006">
-    <mc:Choice xmlns:p14="http://schemas.microsoft.com/office/powerpoint/2010/main" Requires="p14">
+  <mc:AlternateContent xmlns:mc="http://schemas.openxmlformats.org/markup-compatibility/2006" xmlns:p14="http://schemas.microsoft.com/office/powerpoint/2010/main">
+    <mc:Choice Requires="p14">
       <p:transition spd="med" p14:dur="700">
         <p:fade/>
       </p:transition>
     </mc:Choice>
-    <mc:Fallback>
+    <mc:Fallback xmlns="">
       <p:transition spd="med">
         <p:fade/>
       </p:transition>
@@ -3370,13 +3378,13 @@
   <p:clrMapOvr>
     <a:masterClrMapping/>
   </p:clrMapOvr>
-  <mc:AlternateContent xmlns:mc="http://schemas.openxmlformats.org/markup-compatibility/2006">
-    <mc:Choice xmlns:p14="http://schemas.microsoft.com/office/powerpoint/2010/main" Requires="p14">
+  <mc:AlternateContent xmlns:mc="http://schemas.openxmlformats.org/markup-compatibility/2006" xmlns:p14="http://schemas.microsoft.com/office/powerpoint/2010/main">
+    <mc:Choice Requires="p14">
       <p:transition spd="med" p14:dur="700">
         <p:fade/>
       </p:transition>
     </mc:Choice>
-    <mc:Fallback>
+    <mc:Fallback xmlns="">
       <p:transition spd="med">
         <p:fade/>
       </p:transition>
@@ -3772,13 +3780,13 @@
   <p:clrMapOvr>
     <a:masterClrMapping/>
   </p:clrMapOvr>
-  <mc:AlternateContent xmlns:mc="http://schemas.openxmlformats.org/markup-compatibility/2006">
-    <mc:Choice xmlns:p14="http://schemas.microsoft.com/office/powerpoint/2010/main" Requires="p14">
+  <mc:AlternateContent xmlns:mc="http://schemas.openxmlformats.org/markup-compatibility/2006" xmlns:p14="http://schemas.microsoft.com/office/powerpoint/2010/main">
+    <mc:Choice Requires="p14">
       <p:transition spd="med" p14:dur="700">
         <p:fade/>
       </p:transition>
     </mc:Choice>
-    <mc:Fallback>
+    <mc:Fallback xmlns="">
       <p:transition spd="med">
         <p:fade/>
       </p:transition>
@@ -3983,13 +3991,13 @@
   <p:clrMapOvr>
     <a:masterClrMapping/>
   </p:clrMapOvr>
-  <mc:AlternateContent xmlns:mc="http://schemas.openxmlformats.org/markup-compatibility/2006">
-    <mc:Choice xmlns:p14="http://schemas.microsoft.com/office/powerpoint/2010/main" Requires="p14">
+  <mc:AlternateContent xmlns:mc="http://schemas.openxmlformats.org/markup-compatibility/2006" xmlns:p14="http://schemas.microsoft.com/office/powerpoint/2010/main">
+    <mc:Choice Requires="p14">
       <p:transition spd="med" p14:dur="700">
         <p:fade/>
       </p:transition>
     </mc:Choice>
-    <mc:Fallback>
+    <mc:Fallback xmlns="">
       <p:transition spd="med">
         <p:fade/>
       </p:transition>
@@ -4204,13 +4212,13 @@
   <p:clrMapOvr>
     <a:masterClrMapping/>
   </p:clrMapOvr>
-  <mc:AlternateContent xmlns:mc="http://schemas.openxmlformats.org/markup-compatibility/2006">
-    <mc:Choice xmlns:p14="http://schemas.microsoft.com/office/powerpoint/2010/main" Requires="p14">
+  <mc:AlternateContent xmlns:mc="http://schemas.openxmlformats.org/markup-compatibility/2006" xmlns:p14="http://schemas.microsoft.com/office/powerpoint/2010/main">
+    <mc:Choice Requires="p14">
       <p:transition spd="med" p14:dur="700">
         <p:fade/>
       </p:transition>
     </mc:Choice>
-    <mc:Fallback>
+    <mc:Fallback xmlns="">
       <p:transition spd="med">
         <p:fade/>
       </p:transition>
@@ -6636,13 +6644,13 @@
     <p:sldLayoutId id="2147483670" r:id="rId10"/>
     <p:sldLayoutId id="2147483671" r:id="rId11"/>
   </p:sldLayoutIdLst>
-  <mc:AlternateContent xmlns:mc="http://schemas.openxmlformats.org/markup-compatibility/2006">
-    <mc:Choice xmlns:p14="http://schemas.microsoft.com/office/powerpoint/2010/main" Requires="p14">
+  <mc:AlternateContent xmlns:mc="http://schemas.openxmlformats.org/markup-compatibility/2006" xmlns:p14="http://schemas.microsoft.com/office/powerpoint/2010/main">
+    <mc:Choice Requires="p14">
       <p:transition spd="med" p14:dur="700">
         <p:fade/>
       </p:transition>
     </mc:Choice>
-    <mc:Fallback>
+    <mc:Fallback xmlns="">
       <p:transition spd="med">
         <p:fade/>
       </p:transition>
@@ -7029,11 +7037,7 @@
             </a:br>
             <a:r>
               <a:rPr lang="en-US" sz="3600" dirty="0" smtClean="0"/>
-              <a:t>Project </a:t>
-            </a:r>
-            <a:r>
-              <a:rPr lang="en-US" sz="3600" dirty="0" smtClean="0"/>
-              <a:t>Note – Sprint 2</a:t>
+              <a:t>Project Note – Sprint 2</a:t>
             </a:r>
             <a:endParaRPr lang="en-US" sz="4400" dirty="0"/>
           </a:p>
@@ -7049,13 +7053,13 @@
   <p:clrMapOvr>
     <a:masterClrMapping/>
   </p:clrMapOvr>
-  <mc:AlternateContent xmlns:mc="http://schemas.openxmlformats.org/markup-compatibility/2006">
-    <mc:Choice xmlns:p14="http://schemas.microsoft.com/office/powerpoint/2010/main" Requires="p14">
+  <mc:AlternateContent xmlns:mc="http://schemas.openxmlformats.org/markup-compatibility/2006" xmlns:p14="http://schemas.microsoft.com/office/powerpoint/2010/main">
+    <mc:Choice Requires="p14">
       <p:transition spd="med" p14:dur="700">
         <p:fade/>
       </p:transition>
     </mc:Choice>
-    <mc:Fallback>
+    <mc:Fallback xmlns="">
       <p:transition spd="med">
         <p:fade/>
       </p:transition>
@@ -7268,13 +7272,13 @@
   <p:clrMapOvr>
     <a:masterClrMapping/>
   </p:clrMapOvr>
-  <mc:AlternateContent xmlns:mc="http://schemas.openxmlformats.org/markup-compatibility/2006">
-    <mc:Choice xmlns:p14="http://schemas.microsoft.com/office/powerpoint/2010/main" Requires="p14">
+  <mc:AlternateContent xmlns:mc="http://schemas.openxmlformats.org/markup-compatibility/2006" xmlns:p14="http://schemas.microsoft.com/office/powerpoint/2010/main">
+    <mc:Choice Requires="p14">
       <p:transition spd="med" p14:dur="700">
         <p:fade/>
       </p:transition>
     </mc:Choice>
-    <mc:Fallback>
+    <mc:Fallback xmlns="">
       <p:transition spd="med">
         <p:fade/>
       </p:transition>
@@ -7312,7 +7316,7 @@
         </p:nvSpPr>
         <p:spPr>
           <a:xfrm>
-            <a:off x="6901079" y="307761"/>
+            <a:off x="6901079" y="533400"/>
             <a:ext cx="5290921" cy="754601"/>
           </a:xfrm>
         </p:spPr>
@@ -7327,7 +7331,7 @@
             </a:pPr>
             <a:r>
               <a:rPr lang="en-US" sz="3200" dirty="0" smtClean="0"/>
-              <a:t>Decompose conditional</a:t>
+              <a:t>Extract method</a:t>
             </a:r>
             <a:endParaRPr lang="en-US" sz="3200" dirty="0"/>
           </a:p>
@@ -7361,50 +7365,9 @@
           </a:p>
         </p:txBody>
       </p:sp>
-      <p:sp>
-        <p:nvSpPr>
-          <p:cNvPr id="7" name="Right Arrow 6"/>
-          <p:cNvSpPr/>
-          <p:nvPr/>
-        </p:nvSpPr>
-        <p:spPr>
-          <a:xfrm>
-            <a:off x="5917050" y="4085949"/>
-            <a:ext cx="435009" cy="396102"/>
-          </a:xfrm>
-          <a:prstGeom prst="rightArrow">
-            <a:avLst/>
-          </a:prstGeom>
-          <a:ln>
-            <a:noFill/>
-          </a:ln>
-        </p:spPr>
-        <p:style>
-          <a:lnRef idx="1">
-            <a:schemeClr val="accent2"/>
-          </a:lnRef>
-          <a:fillRef idx="2">
-            <a:schemeClr val="accent2"/>
-          </a:fillRef>
-          <a:effectRef idx="1">
-            <a:schemeClr val="accent2"/>
-          </a:effectRef>
-          <a:fontRef idx="minor">
-            <a:schemeClr val="dk1"/>
-          </a:fontRef>
-        </p:style>
-        <p:txBody>
-          <a:bodyPr rtlCol="0" anchor="ctr"/>
-          <a:lstStyle/>
-          <a:p>
-            <a:pPr algn="ctr"/>
-            <a:endParaRPr lang="en-US" dirty="0"/>
-          </a:p>
-        </p:txBody>
-      </p:sp>
       <p:pic>
         <p:nvPicPr>
-          <p:cNvPr id="8" name="Picture 7"/>
+          <p:cNvPr id="9" name="Picture 8"/>
           <p:cNvPicPr/>
           <p:nvPr/>
         </p:nvPicPr>
@@ -7416,8 +7379,8 @@
         </p:blipFill>
         <p:spPr>
           <a:xfrm>
-            <a:off x="364154" y="1512086"/>
-            <a:ext cx="5273166" cy="4933103"/>
+            <a:off x="57777" y="1192565"/>
+            <a:ext cx="6011017" cy="2383017"/>
           </a:xfrm>
           <a:prstGeom prst="rect">
             <a:avLst/>
@@ -7426,7 +7389,7 @@
       </p:pic>
       <p:pic>
         <p:nvPicPr>
-          <p:cNvPr id="10" name="Picture 9"/>
+          <p:cNvPr id="11" name="Picture 10"/>
           <p:cNvPicPr/>
           <p:nvPr/>
         </p:nvPicPr>
@@ -7438,8 +7401,30 @@
         </p:blipFill>
         <p:spPr>
           <a:xfrm>
-            <a:off x="6631789" y="1812525"/>
-            <a:ext cx="5060102" cy="4632664"/>
+            <a:off x="6133889" y="3372862"/>
+            <a:ext cx="6034999" cy="2257048"/>
+          </a:xfrm>
+          <a:prstGeom prst="rect">
+            <a:avLst/>
+          </a:prstGeom>
+        </p:spPr>
+      </p:pic>
+      <p:pic>
+        <p:nvPicPr>
+          <p:cNvPr id="12" name="Picture 11"/>
+          <p:cNvPicPr/>
+          <p:nvPr/>
+        </p:nvPicPr>
+        <p:blipFill>
+          <a:blip r:embed="rId4"/>
+          <a:stretch>
+            <a:fillRect/>
+          </a:stretch>
+        </p:blipFill>
+        <p:spPr>
+          <a:xfrm>
+            <a:off x="6437378" y="5629910"/>
+            <a:ext cx="5731510" cy="1228090"/>
           </a:xfrm>
           <a:prstGeom prst="rect">
             <a:avLst/>
@@ -7449,20 +7434,20 @@
     </p:spTree>
     <p:extLst>
       <p:ext uri="{BB962C8B-B14F-4D97-AF65-F5344CB8AC3E}">
-        <p14:creationId xmlns:p14="http://schemas.microsoft.com/office/powerpoint/2010/main" val="3561807802"/>
+        <p14:creationId xmlns:p14="http://schemas.microsoft.com/office/powerpoint/2010/main" val="2060929966"/>
       </p:ext>
     </p:extLst>
   </p:cSld>
   <p:clrMapOvr>
     <a:masterClrMapping/>
   </p:clrMapOvr>
-  <mc:AlternateContent xmlns:mc="http://schemas.openxmlformats.org/markup-compatibility/2006">
-    <mc:Choice xmlns:p14="http://schemas.microsoft.com/office/powerpoint/2010/main" Requires="p14">
+  <mc:AlternateContent xmlns:mc="http://schemas.openxmlformats.org/markup-compatibility/2006" xmlns:p14="http://schemas.microsoft.com/office/powerpoint/2010/main">
+    <mc:Choice Requires="p14">
       <p:transition spd="med" p14:dur="700">
         <p:fade/>
       </p:transition>
     </mc:Choice>
-    <mc:Fallback>
+    <mc:Fallback xmlns="">
       <p:transition spd="med">
         <p:fade/>
       </p:transition>
@@ -7515,7 +7500,7 @@
             </a:pPr>
             <a:r>
               <a:rPr lang="en-US" sz="3200" dirty="0" smtClean="0"/>
-              <a:t>Extract method</a:t>
+              <a:t>Decompose conditional</a:t>
             </a:r>
             <a:endParaRPr lang="en-US" sz="3200" dirty="0"/>
           </a:p>
@@ -7551,7 +7536,7 @@
       </p:sp>
       <p:pic>
         <p:nvPicPr>
-          <p:cNvPr id="9" name="Picture 8"/>
+          <p:cNvPr id="7" name="Picture 6"/>
           <p:cNvPicPr/>
           <p:nvPr/>
         </p:nvPicPr>
@@ -7563,8 +7548,8 @@
         </p:blipFill>
         <p:spPr>
           <a:xfrm>
-            <a:off x="209522" y="1352363"/>
-            <a:ext cx="6011017" cy="2383017"/>
+            <a:off x="0" y="1288001"/>
+            <a:ext cx="5646029" cy="5569998"/>
           </a:xfrm>
           <a:prstGeom prst="rect">
             <a:avLst/>
@@ -7573,7 +7558,7 @@
       </p:pic>
       <p:pic>
         <p:nvPicPr>
-          <p:cNvPr id="11" name="Picture 10"/>
+          <p:cNvPr id="8" name="Picture 7"/>
           <p:cNvPicPr/>
           <p:nvPr/>
         </p:nvPicPr>
@@ -7585,30 +7570,8 @@
         </p:blipFill>
         <p:spPr>
           <a:xfrm>
-            <a:off x="5917050" y="4600952"/>
-            <a:ext cx="6034999" cy="2257048"/>
-          </a:xfrm>
-          <a:prstGeom prst="rect">
-            <a:avLst/>
-          </a:prstGeom>
-        </p:spPr>
-      </p:pic>
-      <p:pic>
-        <p:nvPicPr>
-          <p:cNvPr id="12" name="Picture 11"/>
-          <p:cNvPicPr/>
-          <p:nvPr/>
-        </p:nvPicPr>
-        <p:blipFill>
-          <a:blip r:embed="rId4"/>
-          <a:stretch>
-            <a:fillRect/>
-          </a:stretch>
-        </p:blipFill>
-        <p:spPr>
-          <a:xfrm>
-            <a:off x="6220539" y="3372862"/>
-            <a:ext cx="5731510" cy="1228090"/>
+            <a:off x="6535484" y="1696775"/>
+            <a:ext cx="5656516" cy="5161225"/>
           </a:xfrm>
           <a:prstGeom prst="rect">
             <a:avLst/>
@@ -7618,7 +7581,7 @@
     </p:spTree>
     <p:extLst>
       <p:ext uri="{BB962C8B-B14F-4D97-AF65-F5344CB8AC3E}">
-        <p14:creationId xmlns:p14="http://schemas.microsoft.com/office/powerpoint/2010/main" val="2060929966"/>
+        <p14:creationId xmlns:p14="http://schemas.microsoft.com/office/powerpoint/2010/main" val="4171104732"/>
       </p:ext>
     </p:extLst>
   </p:cSld>
@@ -7659,18 +7622,18 @@
       </p:grpSpPr>
       <p:sp>
         <p:nvSpPr>
-          <p:cNvPr id="3" name="Title 2"/>
-          <p:cNvSpPr>
-            <a:spLocks noGrp="1"/>
-          </p:cNvSpPr>
-          <p:nvPr>
-            <p:ph type="title"/>
+          <p:cNvPr id="2" name="Content Placeholder 1"/>
+          <p:cNvSpPr>
+            <a:spLocks noGrp="1"/>
+          </p:cNvSpPr>
+          <p:nvPr>
+            <p:ph idx="1"/>
           </p:nvPr>
         </p:nvSpPr>
         <p:spPr>
           <a:xfrm>
-            <a:off x="2279577" y="2492896"/>
-            <a:ext cx="8686801" cy="1066800"/>
+            <a:off x="6901079" y="533400"/>
+            <a:ext cx="5290921" cy="754601"/>
           </a:xfrm>
         </p:spPr>
         <p:txBody>
@@ -7679,22 +7642,134 @@
           </a:bodyPr>
           <a:lstStyle/>
           <a:p>
-            <a:r>
-              <a:rPr lang="en-US" sz="4800" dirty="0" smtClean="0"/>
-              <a:t>Test </a:t>
-            </a:r>
-            <a:r>
-              <a:rPr lang="en-US" sz="4800" dirty="0" smtClean="0"/>
-              <a:t>Note</a:t>
-            </a:r>
-            <a:endParaRPr lang="vi-VN" sz="4800" dirty="0"/>
+            <a:pPr marL="45720" indent="0">
+              <a:buNone/>
+            </a:pPr>
+            <a:r>
+              <a:rPr lang="en-US" sz="3200" dirty="0" smtClean="0"/>
+              <a:t>Split temporary variable</a:t>
+            </a:r>
+            <a:endParaRPr lang="en-US" sz="3200" dirty="0"/>
+          </a:p>
+        </p:txBody>
+      </p:sp>
+      <p:sp>
+        <p:nvSpPr>
+          <p:cNvPr id="3" name="Title 2"/>
+          <p:cNvSpPr>
+            <a:spLocks noGrp="1"/>
+          </p:cNvSpPr>
+          <p:nvPr>
+            <p:ph type="title"/>
+          </p:nvPr>
+        </p:nvSpPr>
+        <p:spPr>
+          <a:xfrm>
+            <a:off x="364154" y="0"/>
+            <a:ext cx="8689064" cy="1066800"/>
+          </a:xfrm>
+        </p:spPr>
+        <p:txBody>
+          <a:bodyPr/>
+          <a:lstStyle/>
+          <a:p>
+            <a:r>
+              <a:rPr lang="en-US" dirty="0" smtClean="0"/>
+              <a:t>Refactoring</a:t>
+            </a:r>
+            <a:endParaRPr lang="en-US" dirty="0"/>
+          </a:p>
+        </p:txBody>
+      </p:sp>
+      <p:pic>
+        <p:nvPicPr>
+          <p:cNvPr id="6" name="Picture 5"/>
+          <p:cNvPicPr/>
+          <p:nvPr/>
+        </p:nvPicPr>
+        <p:blipFill>
+          <a:blip r:embed="rId2"/>
+          <a:stretch>
+            <a:fillRect/>
+          </a:stretch>
+        </p:blipFill>
+        <p:spPr>
+          <a:xfrm>
+            <a:off x="1709200" y="1666653"/>
+            <a:ext cx="7825417" cy="1653595"/>
+          </a:xfrm>
+          <a:prstGeom prst="rect">
+            <a:avLst/>
+          </a:prstGeom>
+        </p:spPr>
+      </p:pic>
+      <p:pic>
+        <p:nvPicPr>
+          <p:cNvPr id="9" name="Picture 8"/>
+          <p:cNvPicPr/>
+          <p:nvPr/>
+        </p:nvPicPr>
+        <p:blipFill>
+          <a:blip r:embed="rId3"/>
+          <a:stretch>
+            <a:fillRect/>
+          </a:stretch>
+        </p:blipFill>
+        <p:spPr>
+          <a:xfrm>
+            <a:off x="1709200" y="5071328"/>
+            <a:ext cx="8020726" cy="1578047"/>
+          </a:xfrm>
+          <a:prstGeom prst="rect">
+            <a:avLst/>
+          </a:prstGeom>
+        </p:spPr>
+      </p:pic>
+      <p:sp>
+        <p:nvSpPr>
+          <p:cNvPr id="4" name="Down Arrow 3"/>
+          <p:cNvSpPr/>
+          <p:nvPr/>
+        </p:nvSpPr>
+        <p:spPr>
+          <a:xfrm>
+            <a:off x="4873841" y="3648722"/>
+            <a:ext cx="390617" cy="994299"/>
+          </a:xfrm>
+          <a:prstGeom prst="downArrow">
+            <a:avLst/>
+          </a:prstGeom>
+          <a:ln>
+            <a:noFill/>
+          </a:ln>
+        </p:spPr>
+        <p:style>
+          <a:lnRef idx="1">
+            <a:schemeClr val="accent2"/>
+          </a:lnRef>
+          <a:fillRef idx="2">
+            <a:schemeClr val="accent2"/>
+          </a:fillRef>
+          <a:effectRef idx="1">
+            <a:schemeClr val="accent2"/>
+          </a:effectRef>
+          <a:fontRef idx="minor">
+            <a:schemeClr val="dk1"/>
+          </a:fontRef>
+        </p:style>
+        <p:txBody>
+          <a:bodyPr rtlCol="0" anchor="ctr"/>
+          <a:lstStyle/>
+          <a:p>
+            <a:pPr algn="ctr"/>
+            <a:endParaRPr lang="en-US" dirty="0"/>
           </a:p>
         </p:txBody>
       </p:sp>
     </p:spTree>
     <p:extLst>
       <p:ext uri="{BB962C8B-B14F-4D97-AF65-F5344CB8AC3E}">
-        <p14:creationId xmlns:p14="http://schemas.microsoft.com/office/powerpoint/2010/main" val="2916585643"/>
+        <p14:creationId xmlns:p14="http://schemas.microsoft.com/office/powerpoint/2010/main" val="1130775391"/>
       </p:ext>
     </p:extLst>
   </p:cSld>
@@ -7713,13 +7788,6 @@
       </p:transition>
     </mc:Fallback>
   </mc:AlternateContent>
-  <p:timing>
-    <p:tnLst>
-      <p:par>
-        <p:cTn id="1" dur="indefinite" restart="never" nodeType="tmRoot"/>
-      </p:par>
-    </p:tnLst>
-  </p:timing>
 </p:sld>
 </file>
 
@@ -7750,6 +7818,85 @@
             <p:ph type="title"/>
           </p:nvPr>
         </p:nvSpPr>
+        <p:spPr>
+          <a:xfrm>
+            <a:off x="2279577" y="2492896"/>
+            <a:ext cx="8686801" cy="1066800"/>
+          </a:xfrm>
+        </p:spPr>
+        <p:txBody>
+          <a:bodyPr>
+            <a:normAutofit/>
+          </a:bodyPr>
+          <a:lstStyle/>
+          <a:p>
+            <a:r>
+              <a:rPr lang="en-US" sz="4800" dirty="0" smtClean="0"/>
+              <a:t>Test Note</a:t>
+            </a:r>
+            <a:endParaRPr lang="vi-VN" sz="4800" dirty="0"/>
+          </a:p>
+        </p:txBody>
+      </p:sp>
+    </p:spTree>
+    <p:extLst>
+      <p:ext uri="{BB962C8B-B14F-4D97-AF65-F5344CB8AC3E}">
+        <p14:creationId xmlns:p14="http://schemas.microsoft.com/office/powerpoint/2010/main" val="2916585643"/>
+      </p:ext>
+    </p:extLst>
+  </p:cSld>
+  <p:clrMapOvr>
+    <a:masterClrMapping/>
+  </p:clrMapOvr>
+  <mc:AlternateContent xmlns:mc="http://schemas.openxmlformats.org/markup-compatibility/2006" xmlns:p14="http://schemas.microsoft.com/office/powerpoint/2010/main">
+    <mc:Choice Requires="p14">
+      <p:transition spd="med" p14:dur="700">
+        <p:fade/>
+      </p:transition>
+    </mc:Choice>
+    <mc:Fallback xmlns="">
+      <p:transition spd="med">
+        <p:fade/>
+      </p:transition>
+    </mc:Fallback>
+  </mc:AlternateContent>
+  <p:timing>
+    <p:tnLst>
+      <p:par>
+        <p:cTn id="1" dur="indefinite" restart="never" nodeType="tmRoot"/>
+      </p:par>
+    </p:tnLst>
+  </p:timing>
+</p:sld>
+</file>
+
+<file path=ppt/slides/slide15.xml><?xml version="1.0" encoding="utf-8"?>
+<p:sld xmlns:a="http://schemas.openxmlformats.org/drawingml/2006/main" xmlns:r="http://schemas.openxmlformats.org/officeDocument/2006/relationships" xmlns:p="http://schemas.openxmlformats.org/presentationml/2006/main">
+  <p:cSld>
+    <p:spTree>
+      <p:nvGrpSpPr>
+        <p:cNvPr id="1" name=""/>
+        <p:cNvGrpSpPr/>
+        <p:nvPr/>
+      </p:nvGrpSpPr>
+      <p:grpSpPr>
+        <a:xfrm>
+          <a:off x="0" y="0"/>
+          <a:ext cx="0" cy="0"/>
+          <a:chOff x="0" y="0"/>
+          <a:chExt cx="0" cy="0"/>
+        </a:xfrm>
+      </p:grpSpPr>
+      <p:sp>
+        <p:nvSpPr>
+          <p:cNvPr id="3" name="Title 2"/>
+          <p:cNvSpPr>
+            <a:spLocks noGrp="1"/>
+          </p:cNvSpPr>
+          <p:nvPr>
+            <p:ph type="title"/>
+          </p:nvPr>
+        </p:nvSpPr>
         <p:spPr/>
         <p:txBody>
           <a:bodyPr/>
@@ -7757,7 +7904,11 @@
           <a:p>
             <a:r>
               <a:rPr lang="en-US" dirty="0" smtClean="0"/>
-              <a:t>Test cases</a:t>
+              <a:t>Test </a:t>
+            </a:r>
+            <a:r>
+              <a:rPr lang="en-US" dirty="0" smtClean="0"/>
+              <a:t>case</a:t>
             </a:r>
             <a:endParaRPr lang="en-US" dirty="0"/>
           </a:p>
@@ -8339,646 +8490,13 @@
   <p:clrMapOvr>
     <a:masterClrMapping/>
   </p:clrMapOvr>
-  <mc:AlternateContent xmlns:mc="http://schemas.openxmlformats.org/markup-compatibility/2006">
-    <mc:Choice xmlns:p14="http://schemas.microsoft.com/office/powerpoint/2010/main" Requires="p14">
+  <mc:AlternateContent xmlns:mc="http://schemas.openxmlformats.org/markup-compatibility/2006" xmlns:p14="http://schemas.microsoft.com/office/powerpoint/2010/main">
+    <mc:Choice Requires="p14">
       <p:transition spd="med" p14:dur="700">
         <p:fade/>
       </p:transition>
     </mc:Choice>
-    <mc:Fallback>
-      <p:transition spd="med">
-        <p:fade/>
-      </p:transition>
-    </mc:Fallback>
-  </mc:AlternateContent>
-</p:sld>
-</file>
-
-<file path=ppt/slides/slide15.xml><?xml version="1.0" encoding="utf-8"?>
-<p:sld xmlns:a="http://schemas.openxmlformats.org/drawingml/2006/main" xmlns:r="http://schemas.openxmlformats.org/officeDocument/2006/relationships" xmlns:p="http://schemas.openxmlformats.org/presentationml/2006/main">
-  <p:cSld>
-    <p:spTree>
-      <p:nvGrpSpPr>
-        <p:cNvPr id="1" name=""/>
-        <p:cNvGrpSpPr/>
-        <p:nvPr/>
-      </p:nvGrpSpPr>
-      <p:grpSpPr>
-        <a:xfrm>
-          <a:off x="0" y="0"/>
-          <a:ext cx="0" cy="0"/>
-          <a:chOff x="0" y="0"/>
-          <a:chExt cx="0" cy="0"/>
-        </a:xfrm>
-      </p:grpSpPr>
-      <p:sp>
-        <p:nvSpPr>
-          <p:cNvPr id="3" name="Title 2"/>
-          <p:cNvSpPr>
-            <a:spLocks noGrp="1"/>
-          </p:cNvSpPr>
-          <p:nvPr>
-            <p:ph type="title"/>
-          </p:nvPr>
-        </p:nvSpPr>
-        <p:spPr/>
-        <p:txBody>
-          <a:bodyPr/>
-          <a:lstStyle/>
-          <a:p>
-            <a:r>
-              <a:rPr lang="en-US" dirty="0" smtClean="0"/>
-              <a:t>Test cases</a:t>
-            </a:r>
-            <a:endParaRPr lang="en-US" dirty="0"/>
-          </a:p>
-        </p:txBody>
-      </p:sp>
-      <p:graphicFrame>
-        <p:nvGraphicFramePr>
-          <p:cNvPr id="2" name="Table 1"/>
-          <p:cNvGraphicFramePr>
-            <a:graphicFrameLocks noGrp="1"/>
-          </p:cNvGraphicFramePr>
-          <p:nvPr>
-            <p:extLst>
-              <p:ext uri="{D42A27DB-BD31-4B8C-83A1-F6EECF244321}">
-                <p14:modId xmlns:p14="http://schemas.microsoft.com/office/powerpoint/2010/main" val="2794301043"/>
-              </p:ext>
-            </p:extLst>
-          </p:nvPr>
-        </p:nvGraphicFramePr>
-        <p:xfrm>
-          <a:off x="1180731" y="1600200"/>
-          <a:ext cx="8851036" cy="5211191"/>
-        </p:xfrm>
-        <a:graphic>
-          <a:graphicData uri="http://schemas.openxmlformats.org/drawingml/2006/table">
-            <a:tbl>
-              <a:tblPr firstRow="1" firstCol="1" bandRow="1">
-                <a:tableStyleId>{5C22544A-7EE6-4342-B048-85BDC9FD1C3A}</a:tableStyleId>
-              </a:tblPr>
-              <a:tblGrid>
-                <a:gridCol w="2140453"/>
-                <a:gridCol w="6710583"/>
-              </a:tblGrid>
-              <a:tr h="513124">
-                <a:tc>
-                  <a:txBody>
-                    <a:bodyPr/>
-                    <a:lstStyle/>
-                    <a:p>
-                      <a:pPr>
-                        <a:lnSpc>
-                          <a:spcPct val="107000"/>
-                        </a:lnSpc>
-                        <a:spcAft>
-                          <a:spcPts val="0"/>
-                        </a:spcAft>
-                      </a:pPr>
-                      <a:r>
-                        <a:rPr lang="en-US" sz="1800" dirty="0">
-                          <a:effectLst/>
-                        </a:rPr>
-                        <a:t>Name</a:t>
-                      </a:r>
-                      <a:endParaRPr lang="en-US" sz="1600" dirty="0">
-                        <a:effectLst/>
-                        <a:latin typeface="Arial" panose="020B0604020202020204" pitchFamily="34" charset="0"/>
-                        <a:ea typeface="Arial" panose="020B0604020202020204" pitchFamily="34" charset="0"/>
-                        <a:cs typeface="Times New Roman" panose="02020603050405020304" pitchFamily="18" charset="0"/>
-                      </a:endParaRPr>
-                    </a:p>
-                  </a:txBody>
-                  <a:tcPr marL="68580" marR="68580" marT="0" marB="0"/>
-                </a:tc>
-                <a:tc>
-                  <a:txBody>
-                    <a:bodyPr/>
-                    <a:lstStyle/>
-                    <a:p>
-                      <a:pPr>
-                        <a:lnSpc>
-                          <a:spcPct val="107000"/>
-                        </a:lnSpc>
-                        <a:spcAft>
-                          <a:spcPts val="0"/>
-                        </a:spcAft>
-                      </a:pPr>
-                      <a:r>
-                        <a:rPr lang="en-US" sz="1800">
-                          <a:effectLst/>
-                        </a:rPr>
-                        <a:t>TC-02: Verify that the user cannot login with a wrong username and a correct password</a:t>
-                      </a:r>
-                      <a:endParaRPr lang="en-US" sz="1600">
-                        <a:effectLst/>
-                        <a:latin typeface="Arial" panose="020B0604020202020204" pitchFamily="34" charset="0"/>
-                        <a:ea typeface="Arial" panose="020B0604020202020204" pitchFamily="34" charset="0"/>
-                        <a:cs typeface="Times New Roman" panose="02020603050405020304" pitchFamily="18" charset="0"/>
-                      </a:endParaRPr>
-                    </a:p>
-                  </a:txBody>
-                  <a:tcPr marL="68580" marR="68580" marT="0" marB="0"/>
-                </a:tc>
-              </a:tr>
-              <a:tr h="513124">
-                <a:tc>
-                  <a:txBody>
-                    <a:bodyPr/>
-                    <a:lstStyle/>
-                    <a:p>
-                      <a:pPr>
-                        <a:lnSpc>
-                          <a:spcPct val="107000"/>
-                        </a:lnSpc>
-                        <a:spcAft>
-                          <a:spcPts val="0"/>
-                        </a:spcAft>
-                      </a:pPr>
-                      <a:r>
-                        <a:rPr lang="en-US" sz="1800" dirty="0">
-                          <a:effectLst/>
-                        </a:rPr>
-                        <a:t>Requirement</a:t>
-                      </a:r>
-                      <a:endParaRPr lang="en-US" sz="1600" dirty="0">
-                        <a:effectLst/>
-                      </a:endParaRPr>
-                    </a:p>
-                    <a:p>
-                      <a:pPr>
-                        <a:lnSpc>
-                          <a:spcPct val="107000"/>
-                        </a:lnSpc>
-                        <a:spcAft>
-                          <a:spcPts val="0"/>
-                        </a:spcAft>
-                      </a:pPr>
-                      <a:r>
-                        <a:rPr lang="en-US" sz="1800" dirty="0">
-                          <a:effectLst/>
-                        </a:rPr>
-                        <a:t> </a:t>
-                      </a:r>
-                      <a:endParaRPr lang="en-US" sz="1600" dirty="0">
-                        <a:effectLst/>
-                        <a:latin typeface="Arial" panose="020B0604020202020204" pitchFamily="34" charset="0"/>
-                        <a:ea typeface="Arial" panose="020B0604020202020204" pitchFamily="34" charset="0"/>
-                        <a:cs typeface="Times New Roman" panose="02020603050405020304" pitchFamily="18" charset="0"/>
-                      </a:endParaRPr>
-                    </a:p>
-                  </a:txBody>
-                  <a:tcPr marL="68580" marR="68580" marT="0" marB="0"/>
-                </a:tc>
-                <a:tc>
-                  <a:txBody>
-                    <a:bodyPr/>
-                    <a:lstStyle/>
-                    <a:p>
-                      <a:pPr>
-                        <a:lnSpc>
-                          <a:spcPct val="107000"/>
-                        </a:lnSpc>
-                        <a:spcAft>
-                          <a:spcPts val="0"/>
-                        </a:spcAft>
-                      </a:pPr>
-                      <a:r>
-                        <a:rPr lang="en-US" sz="1800">
-                          <a:effectLst/>
-                        </a:rPr>
-                        <a:t>FR-01: Login</a:t>
-                      </a:r>
-                      <a:endParaRPr lang="en-US" sz="1600">
-                        <a:effectLst/>
-                        <a:latin typeface="Arial" panose="020B0604020202020204" pitchFamily="34" charset="0"/>
-                        <a:ea typeface="Arial" panose="020B0604020202020204" pitchFamily="34" charset="0"/>
-                        <a:cs typeface="Times New Roman" panose="02020603050405020304" pitchFamily="18" charset="0"/>
-                      </a:endParaRPr>
-                    </a:p>
-                  </a:txBody>
-                  <a:tcPr marL="68580" marR="68580" marT="0" marB="0"/>
-                </a:tc>
-              </a:tr>
-              <a:tr h="513124">
-                <a:tc>
-                  <a:txBody>
-                    <a:bodyPr/>
-                    <a:lstStyle/>
-                    <a:p>
-                      <a:pPr>
-                        <a:lnSpc>
-                          <a:spcPct val="107000"/>
-                        </a:lnSpc>
-                        <a:spcAft>
-                          <a:spcPts val="0"/>
-                        </a:spcAft>
-                      </a:pPr>
-                      <a:r>
-                        <a:rPr lang="en-US" sz="1800" dirty="0">
-                          <a:effectLst/>
-                        </a:rPr>
-                        <a:t>Preconditions</a:t>
-                      </a:r>
-                      <a:br>
-                        <a:rPr lang="en-US" sz="1800" dirty="0">
-                          <a:effectLst/>
-                        </a:rPr>
-                      </a:br>
-                      <a:endParaRPr lang="en-US" sz="1600" dirty="0">
-                        <a:effectLst/>
-                        <a:latin typeface="Arial" panose="020B0604020202020204" pitchFamily="34" charset="0"/>
-                        <a:ea typeface="Arial" panose="020B0604020202020204" pitchFamily="34" charset="0"/>
-                        <a:cs typeface="Times New Roman" panose="02020603050405020304" pitchFamily="18" charset="0"/>
-                      </a:endParaRPr>
-                    </a:p>
-                  </a:txBody>
-                  <a:tcPr marL="68580" marR="68580" marT="0" marB="0"/>
-                </a:tc>
-                <a:tc>
-                  <a:txBody>
-                    <a:bodyPr/>
-                    <a:lstStyle/>
-                    <a:p>
-                      <a:pPr marL="342900" lvl="0" indent="-342900">
-                        <a:lnSpc>
-                          <a:spcPct val="107000"/>
-                        </a:lnSpc>
-                        <a:spcAft>
-                          <a:spcPts val="0"/>
-                        </a:spcAft>
-                        <a:buFont typeface="Symbol" panose="05050102010706020507" pitchFamily="18" charset="2"/>
-                        <a:buChar char=""/>
-                      </a:pPr>
-                      <a:r>
-                        <a:rPr lang="en-US" sz="1800" dirty="0">
-                          <a:effectLst/>
-                        </a:rPr>
-                        <a:t>The username abcd is not in the database.</a:t>
-                      </a:r>
-                      <a:endParaRPr lang="en-US" sz="1600" dirty="0">
-                        <a:effectLst/>
-                      </a:endParaRPr>
-                    </a:p>
-                    <a:p>
-                      <a:pPr marL="342900" lvl="0" indent="-342900">
-                        <a:lnSpc>
-                          <a:spcPct val="107000"/>
-                        </a:lnSpc>
-                        <a:spcAft>
-                          <a:spcPts val="0"/>
-                        </a:spcAft>
-                        <a:buFont typeface="Symbol" panose="05050102010706020507" pitchFamily="18" charset="2"/>
-                        <a:buChar char=""/>
-                      </a:pPr>
-                      <a:r>
-                        <a:rPr lang="en-US" sz="1800" dirty="0">
-                          <a:effectLst/>
-                        </a:rPr>
-                        <a:t>The password 12345 must be available in the database.</a:t>
-                      </a:r>
-                      <a:endParaRPr lang="en-US" sz="1600" dirty="0">
-                        <a:effectLst/>
-                        <a:latin typeface="Arial" panose="020B0604020202020204" pitchFamily="34" charset="0"/>
-                        <a:ea typeface="Arial" panose="020B0604020202020204" pitchFamily="34" charset="0"/>
-                        <a:cs typeface="Times New Roman" panose="02020603050405020304" pitchFamily="18" charset="0"/>
-                      </a:endParaRPr>
-                    </a:p>
-                  </a:txBody>
-                  <a:tcPr marL="68580" marR="68580" marT="0" marB="0"/>
-                </a:tc>
-              </a:tr>
-              <a:tr h="1565141">
-                <a:tc>
-                  <a:txBody>
-                    <a:bodyPr/>
-                    <a:lstStyle/>
-                    <a:p>
-                      <a:pPr>
-                        <a:lnSpc>
-                          <a:spcPct val="107000"/>
-                        </a:lnSpc>
-                        <a:spcAft>
-                          <a:spcPts val="0"/>
-                        </a:spcAft>
-                      </a:pPr>
-                      <a:r>
-                        <a:rPr lang="en-US" sz="1800" dirty="0">
-                          <a:effectLst/>
-                        </a:rPr>
-                        <a:t>Steps</a:t>
-                      </a:r>
-                      <a:endParaRPr lang="en-US" sz="1600" dirty="0">
-                        <a:effectLst/>
-                      </a:endParaRPr>
-                    </a:p>
-                    <a:p>
-                      <a:pPr>
-                        <a:lnSpc>
-                          <a:spcPct val="107000"/>
-                        </a:lnSpc>
-                        <a:spcAft>
-                          <a:spcPts val="0"/>
-                        </a:spcAft>
-                      </a:pPr>
-                      <a:r>
-                        <a:rPr lang="en-US" sz="1800" dirty="0">
-                          <a:effectLst/>
-                        </a:rPr>
-                        <a:t> </a:t>
-                      </a:r>
-                      <a:endParaRPr lang="en-US" sz="1600" dirty="0">
-                        <a:effectLst/>
-                        <a:latin typeface="Arial" panose="020B0604020202020204" pitchFamily="34" charset="0"/>
-                        <a:ea typeface="Arial" panose="020B0604020202020204" pitchFamily="34" charset="0"/>
-                        <a:cs typeface="Times New Roman" panose="02020603050405020304" pitchFamily="18" charset="0"/>
-                      </a:endParaRPr>
-                    </a:p>
-                  </a:txBody>
-                  <a:tcPr marL="68580" marR="68580" marT="0" marB="0"/>
-                </a:tc>
-                <a:tc>
-                  <a:txBody>
-                    <a:bodyPr/>
-                    <a:lstStyle/>
-                    <a:p>
-                      <a:pPr marL="342900" lvl="0" indent="-342900">
-                        <a:lnSpc>
-                          <a:spcPct val="107000"/>
-                        </a:lnSpc>
-                        <a:spcAft>
-                          <a:spcPts val="0"/>
-                        </a:spcAft>
-                        <a:buFont typeface="+mj-lt"/>
-                        <a:buAutoNum type="arabicPeriod"/>
-                      </a:pPr>
-                      <a:r>
-                        <a:rPr lang="en-US" sz="1800" dirty="0">
-                          <a:effectLst/>
-                        </a:rPr>
-                        <a:t>Tap on the “Login” icon.</a:t>
-                      </a:r>
-                      <a:endParaRPr lang="en-US" sz="1600" dirty="0">
-                        <a:effectLst/>
-                      </a:endParaRPr>
-                    </a:p>
-                    <a:p>
-                      <a:pPr marL="342900" lvl="0" indent="-342900">
-                        <a:lnSpc>
-                          <a:spcPct val="107000"/>
-                        </a:lnSpc>
-                        <a:spcAft>
-                          <a:spcPts val="0"/>
-                        </a:spcAft>
-                        <a:buFont typeface="+mj-lt"/>
-                        <a:buAutoNum type="arabicPeriod"/>
-                      </a:pPr>
-                      <a:r>
-                        <a:rPr lang="en-US" sz="1800" dirty="0">
-                          <a:effectLst/>
-                        </a:rPr>
-                        <a:t>Tap on the “Username” field.</a:t>
-                      </a:r>
-                      <a:endParaRPr lang="en-US" sz="1600" dirty="0">
-                        <a:effectLst/>
-                      </a:endParaRPr>
-                    </a:p>
-                    <a:p>
-                      <a:pPr marL="342900" lvl="0" indent="-342900">
-                        <a:lnSpc>
-                          <a:spcPct val="107000"/>
-                        </a:lnSpc>
-                        <a:spcAft>
-                          <a:spcPts val="0"/>
-                        </a:spcAft>
-                        <a:buFont typeface="+mj-lt"/>
-                        <a:buAutoNum type="arabicPeriod"/>
-                      </a:pPr>
-                      <a:r>
-                        <a:rPr lang="en-US" sz="1800" dirty="0">
-                          <a:effectLst/>
-                        </a:rPr>
-                        <a:t>Enter abcd.</a:t>
-                      </a:r>
-                      <a:endParaRPr lang="en-US" sz="1600" dirty="0">
-                        <a:effectLst/>
-                      </a:endParaRPr>
-                    </a:p>
-                    <a:p>
-                      <a:pPr marL="342900" lvl="0" indent="-342900">
-                        <a:lnSpc>
-                          <a:spcPct val="107000"/>
-                        </a:lnSpc>
-                        <a:spcAft>
-                          <a:spcPts val="0"/>
-                        </a:spcAft>
-                        <a:buFont typeface="+mj-lt"/>
-                        <a:buAutoNum type="arabicPeriod"/>
-                      </a:pPr>
-                      <a:r>
-                        <a:rPr lang="en-US" sz="1800" dirty="0">
-                          <a:effectLst/>
-                        </a:rPr>
-                        <a:t>Tap on the “Password” field.</a:t>
-                      </a:r>
-                      <a:endParaRPr lang="en-US" sz="1600" dirty="0">
-                        <a:effectLst/>
-                      </a:endParaRPr>
-                    </a:p>
-                    <a:p>
-                      <a:pPr marL="342900" lvl="0" indent="-342900">
-                        <a:lnSpc>
-                          <a:spcPct val="107000"/>
-                        </a:lnSpc>
-                        <a:spcAft>
-                          <a:spcPts val="0"/>
-                        </a:spcAft>
-                        <a:buFont typeface="+mj-lt"/>
-                        <a:buAutoNum type="arabicPeriod"/>
-                      </a:pPr>
-                      <a:r>
-                        <a:rPr lang="en-US" sz="1800" dirty="0">
-                          <a:effectLst/>
-                        </a:rPr>
-                        <a:t>Enter 12345.</a:t>
-                      </a:r>
-                      <a:endParaRPr lang="en-US" sz="1600" dirty="0">
-                        <a:effectLst/>
-                      </a:endParaRPr>
-                    </a:p>
-                    <a:p>
-                      <a:pPr marL="342900" lvl="0" indent="-342900">
-                        <a:lnSpc>
-                          <a:spcPct val="107000"/>
-                        </a:lnSpc>
-                        <a:spcAft>
-                          <a:spcPts val="0"/>
-                        </a:spcAft>
-                        <a:buFont typeface="+mj-lt"/>
-                        <a:buAutoNum type="arabicPeriod"/>
-                      </a:pPr>
-                      <a:r>
-                        <a:rPr lang="en-US" sz="1800" dirty="0">
-                          <a:effectLst/>
-                        </a:rPr>
-                        <a:t>Tap the “Sign in” button.</a:t>
-                      </a:r>
-                      <a:endParaRPr lang="en-US" sz="1600" dirty="0">
-                        <a:effectLst/>
-                        <a:latin typeface="Arial" panose="020B0604020202020204" pitchFamily="34" charset="0"/>
-                        <a:ea typeface="Arial" panose="020B0604020202020204" pitchFamily="34" charset="0"/>
-                        <a:cs typeface="Times New Roman" panose="02020603050405020304" pitchFamily="18" charset="0"/>
-                      </a:endParaRPr>
-                    </a:p>
-                  </a:txBody>
-                  <a:tcPr marL="68580" marR="68580" marT="0" marB="0"/>
-                </a:tc>
-              </a:tr>
-              <a:tr h="1565141">
-                <a:tc>
-                  <a:txBody>
-                    <a:bodyPr/>
-                    <a:lstStyle/>
-                    <a:p>
-                      <a:pPr>
-                        <a:lnSpc>
-                          <a:spcPct val="107000"/>
-                        </a:lnSpc>
-                        <a:spcAft>
-                          <a:spcPts val="0"/>
-                        </a:spcAft>
-                      </a:pPr>
-                      <a:r>
-                        <a:rPr lang="en-US" sz="1800">
-                          <a:effectLst/>
-                        </a:rPr>
-                        <a:t>Expected Results</a:t>
-                      </a:r>
-                      <a:endParaRPr lang="en-US" sz="1600">
-                        <a:effectLst/>
-                      </a:endParaRPr>
-                    </a:p>
-                    <a:p>
-                      <a:pPr>
-                        <a:lnSpc>
-                          <a:spcPct val="107000"/>
-                        </a:lnSpc>
-                        <a:spcAft>
-                          <a:spcPts val="0"/>
-                        </a:spcAft>
-                      </a:pPr>
-                      <a:r>
-                        <a:rPr lang="en-US" sz="1800">
-                          <a:effectLst/>
-                        </a:rPr>
-                        <a:t> </a:t>
-                      </a:r>
-                      <a:endParaRPr lang="en-US" sz="1600">
-                        <a:effectLst/>
-                        <a:latin typeface="Arial" panose="020B0604020202020204" pitchFamily="34" charset="0"/>
-                        <a:ea typeface="Arial" panose="020B0604020202020204" pitchFamily="34" charset="0"/>
-                        <a:cs typeface="Times New Roman" panose="02020603050405020304" pitchFamily="18" charset="0"/>
-                      </a:endParaRPr>
-                    </a:p>
-                  </a:txBody>
-                  <a:tcPr marL="68580" marR="68580" marT="0" marB="0"/>
-                </a:tc>
-                <a:tc>
-                  <a:txBody>
-                    <a:bodyPr/>
-                    <a:lstStyle/>
-                    <a:p>
-                      <a:pPr marL="742950" lvl="1" indent="-285750">
-                        <a:lnSpc>
-                          <a:spcPct val="107000"/>
-                        </a:lnSpc>
-                        <a:spcAft>
-                          <a:spcPts val="0"/>
-                        </a:spcAft>
-                        <a:buFont typeface="+mj-lt"/>
-                        <a:buAutoNum type="arabicPeriod"/>
-                      </a:pPr>
-                      <a:r>
-                        <a:rPr lang="en-US" sz="1800" dirty="0">
-                          <a:effectLst/>
-                        </a:rPr>
-                        <a:t>The login form dismisses.</a:t>
-                      </a:r>
-                      <a:endParaRPr lang="en-US" sz="1600" dirty="0">
-                        <a:effectLst/>
-                      </a:endParaRPr>
-                    </a:p>
-                    <a:p>
-                      <a:pPr marL="742950" lvl="1" indent="-285750">
-                        <a:lnSpc>
-                          <a:spcPct val="107000"/>
-                        </a:lnSpc>
-                        <a:spcAft>
-                          <a:spcPts val="0"/>
-                        </a:spcAft>
-                        <a:buFont typeface="+mj-lt"/>
-                        <a:buAutoNum type="arabicPeriod"/>
-                      </a:pPr>
-                      <a:r>
-                        <a:rPr lang="en-US" sz="1800" dirty="0">
-                          <a:effectLst/>
-                        </a:rPr>
-                        <a:t>The login form displays with the abcd value in the username field and there is five dots appeared in the password field.</a:t>
-                      </a:r>
-                      <a:endParaRPr lang="en-US" sz="1600" dirty="0">
-                        <a:effectLst/>
-                      </a:endParaRPr>
-                    </a:p>
-                    <a:p>
-                      <a:pPr marL="742950" lvl="1" indent="-285750">
-                        <a:lnSpc>
-                          <a:spcPct val="107000"/>
-                        </a:lnSpc>
-                        <a:spcAft>
-                          <a:spcPts val="0"/>
-                        </a:spcAft>
-                        <a:buFont typeface="+mj-lt"/>
-                        <a:buAutoNum type="arabicPeriod"/>
-                      </a:pPr>
-                      <a:r>
-                        <a:rPr lang="en-US" sz="1800" dirty="0">
-                          <a:effectLst/>
-                        </a:rPr>
-                        <a:t>There is an error message “This username is incorrect” appeared in the username field.</a:t>
-                      </a:r>
-                      <a:endParaRPr lang="en-US" sz="1600" dirty="0">
-                        <a:effectLst/>
-                        <a:latin typeface="Arial" panose="020B0604020202020204" pitchFamily="34" charset="0"/>
-                        <a:ea typeface="Arial" panose="020B0604020202020204" pitchFamily="34" charset="0"/>
-                        <a:cs typeface="Times New Roman" panose="02020603050405020304" pitchFamily="18" charset="0"/>
-                      </a:endParaRPr>
-                    </a:p>
-                  </a:txBody>
-                  <a:tcPr marL="68580" marR="68580" marT="0" marB="0"/>
-                </a:tc>
-              </a:tr>
-            </a:tbl>
-          </a:graphicData>
-        </a:graphic>
-      </p:graphicFrame>
-    </p:spTree>
-    <p:extLst>
-      <p:ext uri="{BB962C8B-B14F-4D97-AF65-F5344CB8AC3E}">
-        <p14:creationId xmlns:p14="http://schemas.microsoft.com/office/powerpoint/2010/main" val="1065773307"/>
-      </p:ext>
-    </p:extLst>
-  </p:cSld>
-  <p:clrMapOvr>
-    <a:masterClrMapping/>
-  </p:clrMapOvr>
-  <mc:AlternateContent xmlns:mc="http://schemas.openxmlformats.org/markup-compatibility/2006">
-    <mc:Choice xmlns:p14="http://schemas.microsoft.com/office/powerpoint/2010/main" Requires="p14">
-      <p:transition spd="med" p14:dur="700">
-        <p:fade/>
-      </p:transition>
-    </mc:Choice>
-    <mc:Fallback>
+    <mc:Fallback xmlns="">
       <p:transition spd="med">
         <p:fade/>
       </p:transition>
@@ -9021,7 +8539,11 @@
           <a:p>
             <a:r>
               <a:rPr lang="en-US" dirty="0" smtClean="0"/>
-              <a:t>Test cases</a:t>
+              <a:t>Test </a:t>
+            </a:r>
+            <a:r>
+              <a:rPr lang="en-US" dirty="0" smtClean="0"/>
+              <a:t>case</a:t>
             </a:r>
             <a:endParaRPr lang="en-US" dirty="0"/>
           </a:p>
@@ -9538,13 +9060,13 @@
   <p:clrMapOvr>
     <a:masterClrMapping/>
   </p:clrMapOvr>
-  <mc:AlternateContent xmlns:mc="http://schemas.openxmlformats.org/markup-compatibility/2006">
-    <mc:Choice xmlns:p14="http://schemas.microsoft.com/office/powerpoint/2010/main" Requires="p14">
+  <mc:AlternateContent xmlns:mc="http://schemas.openxmlformats.org/markup-compatibility/2006" xmlns:p14="http://schemas.microsoft.com/office/powerpoint/2010/main">
+    <mc:Choice Requires="p14">
       <p:transition spd="med" p14:dur="700">
         <p:fade/>
       </p:transition>
     </mc:Choice>
-    <mc:Fallback>
+    <mc:Fallback xmlns="">
       <p:transition spd="med">
         <p:fade/>
       </p:transition>
@@ -9570,6 +9092,477 @@
           <a:chExt cx="0" cy="0"/>
         </a:xfrm>
       </p:grpSpPr>
+      <p:graphicFrame>
+        <p:nvGraphicFramePr>
+          <p:cNvPr id="4" name="Content Placeholder 3"/>
+          <p:cNvGraphicFramePr>
+            <a:graphicFrameLocks noGrp="1"/>
+          </p:cNvGraphicFramePr>
+          <p:nvPr>
+            <p:ph idx="1"/>
+            <p:extLst>
+              <p:ext uri="{D42A27DB-BD31-4B8C-83A1-F6EECF244321}">
+                <p14:modId xmlns:p14="http://schemas.microsoft.com/office/powerpoint/2010/main" val="3472756004"/>
+              </p:ext>
+            </p:extLst>
+          </p:nvPr>
+        </p:nvGraphicFramePr>
+        <p:xfrm>
+          <a:off x="1065490" y="1784412"/>
+          <a:ext cx="8689064" cy="4669653"/>
+        </p:xfrm>
+        <a:graphic>
+          <a:graphicData uri="http://schemas.openxmlformats.org/drawingml/2006/table">
+            <a:tbl>
+              <a:tblPr firstRow="1" firstCol="1" bandRow="1">
+                <a:tableStyleId>{5C22544A-7EE6-4342-B048-85BDC9FD1C3A}</a:tableStyleId>
+              </a:tblPr>
+              <a:tblGrid>
+                <a:gridCol w="2101283"/>
+                <a:gridCol w="6587781"/>
+              </a:tblGrid>
+              <a:tr h="348167">
+                <a:tc>
+                  <a:txBody>
+                    <a:bodyPr/>
+                    <a:lstStyle/>
+                    <a:p>
+                      <a:pPr>
+                        <a:lnSpc>
+                          <a:spcPct val="107000"/>
+                        </a:lnSpc>
+                        <a:spcAft>
+                          <a:spcPts val="0"/>
+                        </a:spcAft>
+                      </a:pPr>
+                      <a:r>
+                        <a:rPr lang="en-US" sz="1800" dirty="0">
+                          <a:effectLst/>
+                        </a:rPr>
+                        <a:t>Name</a:t>
+                      </a:r>
+                      <a:endParaRPr lang="en-US" sz="1600" dirty="0">
+                        <a:effectLst/>
+                        <a:latin typeface="Arial" panose="020B0604020202020204" pitchFamily="34" charset="0"/>
+                        <a:ea typeface="Arial" panose="020B0604020202020204" pitchFamily="34" charset="0"/>
+                        <a:cs typeface="Times New Roman" panose="02020603050405020304" pitchFamily="18" charset="0"/>
+                      </a:endParaRPr>
+                    </a:p>
+                  </a:txBody>
+                  <a:tcPr marL="68580" marR="68580" marT="0" marB="0"/>
+                </a:tc>
+                <a:tc>
+                  <a:txBody>
+                    <a:bodyPr/>
+                    <a:lstStyle/>
+                    <a:p>
+                      <a:pPr>
+                        <a:lnSpc>
+                          <a:spcPct val="107000"/>
+                        </a:lnSpc>
+                        <a:spcAft>
+                          <a:spcPts val="0"/>
+                        </a:spcAft>
+                      </a:pPr>
+                      <a:r>
+                        <a:rPr lang="en-US" sz="1800">
+                          <a:effectLst/>
+                        </a:rPr>
+                        <a:t>TC-17: Verify that the user can get a list of studying courses</a:t>
+                      </a:r>
+                      <a:endParaRPr lang="en-US" sz="1600">
+                        <a:effectLst/>
+                        <a:latin typeface="Arial" panose="020B0604020202020204" pitchFamily="34" charset="0"/>
+                        <a:ea typeface="Arial" panose="020B0604020202020204" pitchFamily="34" charset="0"/>
+                        <a:cs typeface="Times New Roman" panose="02020603050405020304" pitchFamily="18" charset="0"/>
+                      </a:endParaRPr>
+                    </a:p>
+                  </a:txBody>
+                  <a:tcPr marL="68580" marR="68580" marT="0" marB="0"/>
+                </a:tc>
+              </a:tr>
+              <a:tr h="714269">
+                <a:tc>
+                  <a:txBody>
+                    <a:bodyPr/>
+                    <a:lstStyle/>
+                    <a:p>
+                      <a:pPr>
+                        <a:lnSpc>
+                          <a:spcPct val="107000"/>
+                        </a:lnSpc>
+                        <a:spcAft>
+                          <a:spcPts val="0"/>
+                        </a:spcAft>
+                      </a:pPr>
+                      <a:r>
+                        <a:rPr lang="en-US" sz="1800">
+                          <a:effectLst/>
+                        </a:rPr>
+                        <a:t>Requirement</a:t>
+                      </a:r>
+                      <a:endParaRPr lang="en-US" sz="1600">
+                        <a:effectLst/>
+                      </a:endParaRPr>
+                    </a:p>
+                    <a:p>
+                      <a:pPr>
+                        <a:lnSpc>
+                          <a:spcPct val="107000"/>
+                        </a:lnSpc>
+                        <a:spcAft>
+                          <a:spcPts val="0"/>
+                        </a:spcAft>
+                      </a:pPr>
+                      <a:r>
+                        <a:rPr lang="en-US" sz="1800">
+                          <a:effectLst/>
+                        </a:rPr>
+                        <a:t> </a:t>
+                      </a:r>
+                      <a:endParaRPr lang="en-US" sz="1600">
+                        <a:effectLst/>
+                        <a:latin typeface="Arial" panose="020B0604020202020204" pitchFamily="34" charset="0"/>
+                        <a:ea typeface="Arial" panose="020B0604020202020204" pitchFamily="34" charset="0"/>
+                        <a:cs typeface="Times New Roman" panose="02020603050405020304" pitchFamily="18" charset="0"/>
+                      </a:endParaRPr>
+                    </a:p>
+                  </a:txBody>
+                  <a:tcPr marL="68580" marR="68580" marT="0" marB="0"/>
+                </a:tc>
+                <a:tc>
+                  <a:txBody>
+                    <a:bodyPr/>
+                    <a:lstStyle/>
+                    <a:p>
+                      <a:pPr>
+                        <a:lnSpc>
+                          <a:spcPct val="107000"/>
+                        </a:lnSpc>
+                        <a:spcAft>
+                          <a:spcPts val="0"/>
+                        </a:spcAft>
+                      </a:pPr>
+                      <a:r>
+                        <a:rPr lang="en-US" sz="1800">
+                          <a:effectLst/>
+                        </a:rPr>
+                        <a:t>FR-10: Get-studying-courses</a:t>
+                      </a:r>
+                      <a:endParaRPr lang="en-US" sz="1600">
+                        <a:effectLst/>
+                        <a:latin typeface="Arial" panose="020B0604020202020204" pitchFamily="34" charset="0"/>
+                        <a:ea typeface="Arial" panose="020B0604020202020204" pitchFamily="34" charset="0"/>
+                        <a:cs typeface="Times New Roman" panose="02020603050405020304" pitchFamily="18" charset="0"/>
+                      </a:endParaRPr>
+                    </a:p>
+                  </a:txBody>
+                  <a:tcPr marL="68580" marR="68580" marT="0" marB="0"/>
+                </a:tc>
+              </a:tr>
+              <a:tr h="1812577">
+                <a:tc>
+                  <a:txBody>
+                    <a:bodyPr/>
+                    <a:lstStyle/>
+                    <a:p>
+                      <a:pPr>
+                        <a:lnSpc>
+                          <a:spcPct val="107000"/>
+                        </a:lnSpc>
+                        <a:spcAft>
+                          <a:spcPts val="0"/>
+                        </a:spcAft>
+                      </a:pPr>
+                      <a:r>
+                        <a:rPr lang="en-US" sz="1800" dirty="0">
+                          <a:effectLst/>
+                        </a:rPr>
+                        <a:t>Preconditions</a:t>
+                      </a:r>
+                      <a:br>
+                        <a:rPr lang="en-US" sz="1800" dirty="0">
+                          <a:effectLst/>
+                        </a:rPr>
+                      </a:br>
+                      <a:endParaRPr lang="en-US" sz="1600" dirty="0">
+                        <a:effectLst/>
+                        <a:latin typeface="Arial" panose="020B0604020202020204" pitchFamily="34" charset="0"/>
+                        <a:ea typeface="Arial" panose="020B0604020202020204" pitchFamily="34" charset="0"/>
+                        <a:cs typeface="Times New Roman" panose="02020603050405020304" pitchFamily="18" charset="0"/>
+                      </a:endParaRPr>
+                    </a:p>
+                  </a:txBody>
+                  <a:tcPr marL="68580" marR="68580" marT="0" marB="0"/>
+                </a:tc>
+                <a:tc>
+                  <a:txBody>
+                    <a:bodyPr/>
+                    <a:lstStyle/>
+                    <a:p>
+                      <a:pPr marL="342900" lvl="0" indent="-342900">
+                        <a:lnSpc>
+                          <a:spcPct val="107000"/>
+                        </a:lnSpc>
+                        <a:spcAft>
+                          <a:spcPts val="0"/>
+                        </a:spcAft>
+                        <a:buFont typeface="Symbol" panose="05050102010706020507" pitchFamily="18" charset="2"/>
+                        <a:buChar char=""/>
+                        <a:tabLst>
+                          <a:tab pos="4312285" algn="r"/>
+                        </a:tabLst>
+                      </a:pPr>
+                      <a:r>
+                        <a:rPr lang="en-US" sz="1800" dirty="0">
+                          <a:effectLst/>
+                        </a:rPr>
+                        <a:t>The “Departments” page is loaded.</a:t>
+                      </a:r>
+                      <a:endParaRPr lang="en-US" sz="1600" dirty="0">
+                        <a:effectLst/>
+                      </a:endParaRPr>
+                    </a:p>
+                    <a:p>
+                      <a:pPr marL="342900" lvl="0" indent="-342900">
+                        <a:lnSpc>
+                          <a:spcPct val="107000"/>
+                        </a:lnSpc>
+                        <a:spcAft>
+                          <a:spcPts val="0"/>
+                        </a:spcAft>
+                        <a:buFont typeface="Symbol" panose="05050102010706020507" pitchFamily="18" charset="2"/>
+                        <a:buChar char=""/>
+                        <a:tabLst>
+                          <a:tab pos="4312285" algn="r"/>
+                        </a:tabLst>
+                      </a:pPr>
+                      <a:r>
+                        <a:rPr lang="en-US" sz="1800" dirty="0">
+                          <a:effectLst/>
+                        </a:rPr>
+                        <a:t>The user has logged in with username itiu09008 and password 12345.</a:t>
+                      </a:r>
+                      <a:endParaRPr lang="en-US" sz="1600" dirty="0">
+                        <a:effectLst/>
+                      </a:endParaRPr>
+                    </a:p>
+                    <a:p>
+                      <a:pPr marL="342900" lvl="0" indent="-342900">
+                        <a:lnSpc>
+                          <a:spcPct val="107000"/>
+                        </a:lnSpc>
+                        <a:spcAft>
+                          <a:spcPts val="0"/>
+                        </a:spcAft>
+                        <a:buFont typeface="Symbol" panose="05050102010706020507" pitchFamily="18" charset="2"/>
+                        <a:buChar char=""/>
+                        <a:tabLst>
+                          <a:tab pos="4312285" algn="r"/>
+                        </a:tabLst>
+                      </a:pPr>
+                      <a:r>
+                        <a:rPr lang="en-US" sz="1800" dirty="0">
+                          <a:effectLst/>
+                        </a:rPr>
+                        <a:t>The studying course of the user with username itiu09008 in the database must be “Software Project Management”.</a:t>
+                      </a:r>
+                      <a:endParaRPr lang="en-US" sz="1600" dirty="0">
+                        <a:effectLst/>
+                        <a:latin typeface="Arial" panose="020B0604020202020204" pitchFamily="34" charset="0"/>
+                        <a:ea typeface="Arial" panose="020B0604020202020204" pitchFamily="34" charset="0"/>
+                        <a:cs typeface="Times New Roman" panose="02020603050405020304" pitchFamily="18" charset="0"/>
+                      </a:endParaRPr>
+                    </a:p>
+                  </a:txBody>
+                  <a:tcPr marL="68580" marR="68580" marT="0" marB="0"/>
+                </a:tc>
+              </a:tr>
+              <a:tr h="714269">
+                <a:tc>
+                  <a:txBody>
+                    <a:bodyPr/>
+                    <a:lstStyle/>
+                    <a:p>
+                      <a:pPr>
+                        <a:lnSpc>
+                          <a:spcPct val="107000"/>
+                        </a:lnSpc>
+                        <a:spcAft>
+                          <a:spcPts val="0"/>
+                        </a:spcAft>
+                      </a:pPr>
+                      <a:r>
+                        <a:rPr lang="en-US" sz="1800">
+                          <a:effectLst/>
+                        </a:rPr>
+                        <a:t>Steps</a:t>
+                      </a:r>
+                      <a:endParaRPr lang="en-US" sz="1600">
+                        <a:effectLst/>
+                      </a:endParaRPr>
+                    </a:p>
+                    <a:p>
+                      <a:pPr>
+                        <a:lnSpc>
+                          <a:spcPct val="107000"/>
+                        </a:lnSpc>
+                        <a:spcAft>
+                          <a:spcPts val="0"/>
+                        </a:spcAft>
+                      </a:pPr>
+                      <a:r>
+                        <a:rPr lang="en-US" sz="1800">
+                          <a:effectLst/>
+                        </a:rPr>
+                        <a:t> </a:t>
+                      </a:r>
+                      <a:endParaRPr lang="en-US" sz="1600">
+                        <a:effectLst/>
+                        <a:latin typeface="Arial" panose="020B0604020202020204" pitchFamily="34" charset="0"/>
+                        <a:ea typeface="Arial" panose="020B0604020202020204" pitchFamily="34" charset="0"/>
+                        <a:cs typeface="Times New Roman" panose="02020603050405020304" pitchFamily="18" charset="0"/>
+                      </a:endParaRPr>
+                    </a:p>
+                  </a:txBody>
+                  <a:tcPr marL="68580" marR="68580" marT="0" marB="0"/>
+                </a:tc>
+                <a:tc>
+                  <a:txBody>
+                    <a:bodyPr/>
+                    <a:lstStyle/>
+                    <a:p>
+                      <a:pPr>
+                        <a:lnSpc>
+                          <a:spcPct val="107000"/>
+                        </a:lnSpc>
+                        <a:spcAft>
+                          <a:spcPts val="0"/>
+                        </a:spcAft>
+                      </a:pPr>
+                      <a:r>
+                        <a:rPr lang="en-US" sz="1800" dirty="0">
+                          <a:effectLst/>
+                        </a:rPr>
+                        <a:t>Tap on the “My Courses” button.</a:t>
+                      </a:r>
+                      <a:endParaRPr lang="en-US" sz="1600" dirty="0">
+                        <a:effectLst/>
+                        <a:latin typeface="Arial" panose="020B0604020202020204" pitchFamily="34" charset="0"/>
+                        <a:ea typeface="Arial" panose="020B0604020202020204" pitchFamily="34" charset="0"/>
+                        <a:cs typeface="Times New Roman" panose="02020603050405020304" pitchFamily="18" charset="0"/>
+                      </a:endParaRPr>
+                    </a:p>
+                  </a:txBody>
+                  <a:tcPr marL="68580" marR="68580" marT="0" marB="0"/>
+                </a:tc>
+              </a:tr>
+              <a:tr h="1080371">
+                <a:tc>
+                  <a:txBody>
+                    <a:bodyPr/>
+                    <a:lstStyle/>
+                    <a:p>
+                      <a:pPr>
+                        <a:lnSpc>
+                          <a:spcPct val="107000"/>
+                        </a:lnSpc>
+                        <a:spcAft>
+                          <a:spcPts val="0"/>
+                        </a:spcAft>
+                      </a:pPr>
+                      <a:r>
+                        <a:rPr lang="en-US" sz="1800">
+                          <a:effectLst/>
+                        </a:rPr>
+                        <a:t>Expected Results</a:t>
+                      </a:r>
+                      <a:endParaRPr lang="en-US" sz="1600">
+                        <a:effectLst/>
+                      </a:endParaRPr>
+                    </a:p>
+                    <a:p>
+                      <a:pPr>
+                        <a:lnSpc>
+                          <a:spcPct val="107000"/>
+                        </a:lnSpc>
+                        <a:spcAft>
+                          <a:spcPts val="0"/>
+                        </a:spcAft>
+                      </a:pPr>
+                      <a:r>
+                        <a:rPr lang="en-US" sz="1800">
+                          <a:effectLst/>
+                        </a:rPr>
+                        <a:t> </a:t>
+                      </a:r>
+                      <a:endParaRPr lang="en-US" sz="1600">
+                        <a:effectLst/>
+                        <a:latin typeface="Arial" panose="020B0604020202020204" pitchFamily="34" charset="0"/>
+                        <a:ea typeface="Arial" panose="020B0604020202020204" pitchFamily="34" charset="0"/>
+                        <a:cs typeface="Times New Roman" panose="02020603050405020304" pitchFamily="18" charset="0"/>
+                      </a:endParaRPr>
+                    </a:p>
+                  </a:txBody>
+                  <a:tcPr marL="68580" marR="68580" marT="0" marB="0"/>
+                </a:tc>
+                <a:tc>
+                  <a:txBody>
+                    <a:bodyPr/>
+                    <a:lstStyle/>
+                    <a:p>
+                      <a:pPr marL="342900" lvl="0" indent="-342900">
+                        <a:lnSpc>
+                          <a:spcPct val="107000"/>
+                        </a:lnSpc>
+                        <a:spcAft>
+                          <a:spcPts val="0"/>
+                        </a:spcAft>
+                        <a:buFont typeface="+mj-lt"/>
+                        <a:buAutoNum type="arabicPeriod"/>
+                      </a:pPr>
+                      <a:r>
+                        <a:rPr lang="en-US" sz="1800" dirty="0">
+                          <a:effectLst/>
+                        </a:rPr>
+                        <a:t>The “Departments” page dismisses.</a:t>
+                      </a:r>
+                      <a:endParaRPr lang="en-US" sz="1600" dirty="0">
+                        <a:effectLst/>
+                      </a:endParaRPr>
+                    </a:p>
+                    <a:p>
+                      <a:pPr marL="342900" lvl="0" indent="-342900">
+                        <a:lnSpc>
+                          <a:spcPct val="107000"/>
+                        </a:lnSpc>
+                        <a:spcAft>
+                          <a:spcPts val="0"/>
+                        </a:spcAft>
+                        <a:buFont typeface="+mj-lt"/>
+                        <a:buAutoNum type="arabicPeriod"/>
+                      </a:pPr>
+                      <a:r>
+                        <a:rPr lang="en-US" sz="1800" dirty="0">
+                          <a:effectLst/>
+                        </a:rPr>
+                        <a:t>The “Courses” page displays and the course list contains a “Software Project Management” course.</a:t>
+                      </a:r>
+                      <a:endParaRPr lang="en-US" sz="1600" dirty="0">
+                        <a:effectLst/>
+                        <a:latin typeface="Arial" panose="020B0604020202020204" pitchFamily="34" charset="0"/>
+                        <a:ea typeface="Arial" panose="020B0604020202020204" pitchFamily="34" charset="0"/>
+                        <a:cs typeface="Times New Roman" panose="02020603050405020304" pitchFamily="18" charset="0"/>
+                      </a:endParaRPr>
+                    </a:p>
+                  </a:txBody>
+                  <a:tcPr marL="68580" marR="68580" marT="0" marB="0"/>
+                </a:tc>
+              </a:tr>
+            </a:tbl>
+          </a:graphicData>
+        </a:graphic>
+      </p:graphicFrame>
       <p:sp>
         <p:nvSpPr>
           <p:cNvPr id="3" name="Title 2"/>
@@ -9580,30 +9573,23 @@
             <p:ph type="title"/>
           </p:nvPr>
         </p:nvSpPr>
-        <p:spPr>
-          <a:xfrm>
-            <a:off x="2279577" y="2492896"/>
-            <a:ext cx="8686801" cy="1066800"/>
-          </a:xfrm>
-        </p:spPr>
-        <p:txBody>
-          <a:bodyPr>
-            <a:normAutofit/>
-          </a:bodyPr>
+        <p:spPr/>
+        <p:txBody>
+          <a:bodyPr/>
           <a:lstStyle/>
           <a:p>
             <a:r>
-              <a:rPr lang="en-US" sz="4800" smtClean="0"/>
-              <a:t>Demo</a:t>
-            </a:r>
-            <a:endParaRPr lang="vi-VN" sz="4800" dirty="0"/>
+              <a:rPr lang="en-US" dirty="0" smtClean="0"/>
+              <a:t>Test case</a:t>
+            </a:r>
+            <a:endParaRPr lang="en-US" dirty="0"/>
           </a:p>
         </p:txBody>
       </p:sp>
     </p:spTree>
     <p:extLst>
       <p:ext uri="{BB962C8B-B14F-4D97-AF65-F5344CB8AC3E}">
-        <p14:creationId xmlns:p14="http://schemas.microsoft.com/office/powerpoint/2010/main" val="589343847"/>
+        <p14:creationId xmlns:p14="http://schemas.microsoft.com/office/powerpoint/2010/main" val="1440377907"/>
       </p:ext>
     </p:extLst>
   </p:cSld>
@@ -9622,13 +9608,672 @@
       </p:transition>
     </mc:Fallback>
   </mc:AlternateContent>
-  <p:timing>
-    <p:tnLst>
-      <p:par>
-        <p:cTn id="1" dur="indefinite" restart="never" nodeType="tmRoot"/>
-      </p:par>
-    </p:tnLst>
-  </p:timing>
+</p:sld>
+</file>
+
+<file path=ppt/slides/slide18.xml><?xml version="1.0" encoding="utf-8"?>
+<p:sld xmlns:a="http://schemas.openxmlformats.org/drawingml/2006/main" xmlns:r="http://schemas.openxmlformats.org/officeDocument/2006/relationships" xmlns:p="http://schemas.openxmlformats.org/presentationml/2006/main">
+  <p:cSld>
+    <p:spTree>
+      <p:nvGrpSpPr>
+        <p:cNvPr id="1" name=""/>
+        <p:cNvGrpSpPr/>
+        <p:nvPr/>
+      </p:nvGrpSpPr>
+      <p:grpSpPr>
+        <a:xfrm>
+          <a:off x="0" y="0"/>
+          <a:ext cx="0" cy="0"/>
+          <a:chOff x="0" y="0"/>
+          <a:chExt cx="0" cy="0"/>
+        </a:xfrm>
+      </p:grpSpPr>
+      <p:sp>
+        <p:nvSpPr>
+          <p:cNvPr id="3" name="Title 2"/>
+          <p:cNvSpPr>
+            <a:spLocks noGrp="1"/>
+          </p:cNvSpPr>
+          <p:nvPr>
+            <p:ph type="title"/>
+          </p:nvPr>
+        </p:nvSpPr>
+        <p:spPr/>
+        <p:txBody>
+          <a:bodyPr/>
+          <a:lstStyle/>
+          <a:p>
+            <a:r>
+              <a:rPr lang="en-US" dirty="0" smtClean="0"/>
+              <a:t>Test case</a:t>
+            </a:r>
+            <a:endParaRPr lang="en-US" dirty="0"/>
+          </a:p>
+        </p:txBody>
+      </p:sp>
+      <p:graphicFrame>
+        <p:nvGraphicFramePr>
+          <p:cNvPr id="5" name="Content Placeholder 4"/>
+          <p:cNvGraphicFramePr>
+            <a:graphicFrameLocks noGrp="1"/>
+          </p:cNvGraphicFramePr>
+          <p:nvPr>
+            <p:ph idx="1"/>
+            <p:extLst>
+              <p:ext uri="{D42A27DB-BD31-4B8C-83A1-F6EECF244321}">
+                <p14:modId xmlns:p14="http://schemas.microsoft.com/office/powerpoint/2010/main" val="857720265"/>
+              </p:ext>
+            </p:extLst>
+          </p:nvPr>
+        </p:nvGraphicFramePr>
+        <p:xfrm>
+          <a:off x="1198485" y="1926454"/>
+          <a:ext cx="9374820" cy="4660778"/>
+        </p:xfrm>
+        <a:graphic>
+          <a:graphicData uri="http://schemas.openxmlformats.org/drawingml/2006/table">
+            <a:tbl>
+              <a:tblPr firstRow="1" firstCol="1" bandRow="1">
+                <a:tableStyleId>{5C22544A-7EE6-4342-B048-85BDC9FD1C3A}</a:tableStyleId>
+              </a:tblPr>
+              <a:tblGrid>
+                <a:gridCol w="2267120"/>
+                <a:gridCol w="7107700"/>
+              </a:tblGrid>
+              <a:tr h="616279">
+                <a:tc>
+                  <a:txBody>
+                    <a:bodyPr/>
+                    <a:lstStyle/>
+                    <a:p>
+                      <a:pPr>
+                        <a:lnSpc>
+                          <a:spcPct val="107000"/>
+                        </a:lnSpc>
+                        <a:spcAft>
+                          <a:spcPts val="0"/>
+                        </a:spcAft>
+                      </a:pPr>
+                      <a:r>
+                        <a:rPr lang="en-US" sz="1800" dirty="0">
+                          <a:effectLst/>
+                        </a:rPr>
+                        <a:t>Name</a:t>
+                      </a:r>
+                      <a:endParaRPr lang="en-US" sz="1600" dirty="0">
+                        <a:effectLst/>
+                        <a:latin typeface="Arial" panose="020B0604020202020204" pitchFamily="34" charset="0"/>
+                        <a:ea typeface="Arial" panose="020B0604020202020204" pitchFamily="34" charset="0"/>
+                        <a:cs typeface="Times New Roman" panose="02020603050405020304" pitchFamily="18" charset="0"/>
+                      </a:endParaRPr>
+                    </a:p>
+                  </a:txBody>
+                  <a:tcPr marL="68580" marR="68580" marT="0" marB="0"/>
+                </a:tc>
+                <a:tc>
+                  <a:txBody>
+                    <a:bodyPr/>
+                    <a:lstStyle/>
+                    <a:p>
+                      <a:pPr>
+                        <a:lnSpc>
+                          <a:spcPct val="107000"/>
+                        </a:lnSpc>
+                        <a:spcAft>
+                          <a:spcPts val="0"/>
+                        </a:spcAft>
+                      </a:pPr>
+                      <a:r>
+                        <a:rPr lang="en-US" sz="1800">
+                          <a:effectLst/>
+                        </a:rPr>
+                        <a:t>TC-13: Verify that the user can get the detailed information of an event</a:t>
+                      </a:r>
+                      <a:endParaRPr lang="en-US" sz="1600">
+                        <a:effectLst/>
+                        <a:latin typeface="Arial" panose="020B0604020202020204" pitchFamily="34" charset="0"/>
+                        <a:ea typeface="Arial" panose="020B0604020202020204" pitchFamily="34" charset="0"/>
+                        <a:cs typeface="Times New Roman" panose="02020603050405020304" pitchFamily="18" charset="0"/>
+                      </a:endParaRPr>
+                    </a:p>
+                  </a:txBody>
+                  <a:tcPr marL="68580" marR="68580" marT="0" marB="0"/>
+                </a:tc>
+              </a:tr>
+              <a:tr h="616279">
+                <a:tc>
+                  <a:txBody>
+                    <a:bodyPr/>
+                    <a:lstStyle/>
+                    <a:p>
+                      <a:pPr>
+                        <a:lnSpc>
+                          <a:spcPct val="107000"/>
+                        </a:lnSpc>
+                        <a:spcAft>
+                          <a:spcPts val="0"/>
+                        </a:spcAft>
+                      </a:pPr>
+                      <a:r>
+                        <a:rPr lang="en-US" sz="1800" dirty="0">
+                          <a:effectLst/>
+                        </a:rPr>
+                        <a:t>Requirement</a:t>
+                      </a:r>
+                      <a:endParaRPr lang="en-US" sz="1600" dirty="0">
+                        <a:effectLst/>
+                      </a:endParaRPr>
+                    </a:p>
+                    <a:p>
+                      <a:pPr>
+                        <a:lnSpc>
+                          <a:spcPct val="107000"/>
+                        </a:lnSpc>
+                        <a:spcAft>
+                          <a:spcPts val="0"/>
+                        </a:spcAft>
+                      </a:pPr>
+                      <a:r>
+                        <a:rPr lang="en-US" sz="1800" dirty="0">
+                          <a:effectLst/>
+                        </a:rPr>
+                        <a:t> </a:t>
+                      </a:r>
+                      <a:endParaRPr lang="en-US" sz="1600" dirty="0">
+                        <a:effectLst/>
+                        <a:latin typeface="Arial" panose="020B0604020202020204" pitchFamily="34" charset="0"/>
+                        <a:ea typeface="Arial" panose="020B0604020202020204" pitchFamily="34" charset="0"/>
+                        <a:cs typeface="Times New Roman" panose="02020603050405020304" pitchFamily="18" charset="0"/>
+                      </a:endParaRPr>
+                    </a:p>
+                  </a:txBody>
+                  <a:tcPr marL="68580" marR="68580" marT="0" marB="0"/>
+                </a:tc>
+                <a:tc>
+                  <a:txBody>
+                    <a:bodyPr/>
+                    <a:lstStyle/>
+                    <a:p>
+                      <a:pPr>
+                        <a:lnSpc>
+                          <a:spcPct val="107000"/>
+                        </a:lnSpc>
+                        <a:spcAft>
+                          <a:spcPts val="0"/>
+                        </a:spcAft>
+                      </a:pPr>
+                      <a:r>
+                        <a:rPr lang="en-US" sz="1800">
+                          <a:effectLst/>
+                        </a:rPr>
+                        <a:t>FR-06: Get-event-detail</a:t>
+                      </a:r>
+                      <a:endParaRPr lang="en-US" sz="1600">
+                        <a:effectLst/>
+                        <a:latin typeface="Arial" panose="020B0604020202020204" pitchFamily="34" charset="0"/>
+                        <a:ea typeface="Arial" panose="020B0604020202020204" pitchFamily="34" charset="0"/>
+                        <a:cs typeface="Times New Roman" panose="02020603050405020304" pitchFamily="18" charset="0"/>
+                      </a:endParaRPr>
+                    </a:p>
+                  </a:txBody>
+                  <a:tcPr marL="68580" marR="68580" marT="0" marB="0"/>
+                </a:tc>
+              </a:tr>
+              <a:tr h="932156">
+                <a:tc>
+                  <a:txBody>
+                    <a:bodyPr/>
+                    <a:lstStyle/>
+                    <a:p>
+                      <a:pPr>
+                        <a:lnSpc>
+                          <a:spcPct val="107000"/>
+                        </a:lnSpc>
+                        <a:spcAft>
+                          <a:spcPts val="0"/>
+                        </a:spcAft>
+                      </a:pPr>
+                      <a:r>
+                        <a:rPr lang="en-US" sz="1800" dirty="0">
+                          <a:effectLst/>
+                        </a:rPr>
+                        <a:t>Preconditions</a:t>
+                      </a:r>
+                      <a:br>
+                        <a:rPr lang="en-US" sz="1800" dirty="0">
+                          <a:effectLst/>
+                        </a:rPr>
+                      </a:br>
+                      <a:endParaRPr lang="en-US" sz="1600" dirty="0">
+                        <a:effectLst/>
+                        <a:latin typeface="Arial" panose="020B0604020202020204" pitchFamily="34" charset="0"/>
+                        <a:ea typeface="Arial" panose="020B0604020202020204" pitchFamily="34" charset="0"/>
+                        <a:cs typeface="Times New Roman" panose="02020603050405020304" pitchFamily="18" charset="0"/>
+                      </a:endParaRPr>
+                    </a:p>
+                  </a:txBody>
+                  <a:tcPr marL="68580" marR="68580" marT="0" marB="0"/>
+                </a:tc>
+                <a:tc>
+                  <a:txBody>
+                    <a:bodyPr/>
+                    <a:lstStyle/>
+                    <a:p>
+                      <a:pPr marL="342900" lvl="0" indent="-342900">
+                        <a:lnSpc>
+                          <a:spcPct val="107000"/>
+                        </a:lnSpc>
+                        <a:spcAft>
+                          <a:spcPts val="0"/>
+                        </a:spcAft>
+                        <a:buFont typeface="Symbol" panose="05050102010706020507" pitchFamily="18" charset="2"/>
+                        <a:buChar char=""/>
+                        <a:tabLst>
+                          <a:tab pos="4312285" algn="r"/>
+                        </a:tabLst>
+                      </a:pPr>
+                      <a:r>
+                        <a:rPr lang="en-US" sz="1800" dirty="0">
+                          <a:effectLst/>
+                        </a:rPr>
+                        <a:t>The upcoming event list is loaded.</a:t>
+                      </a:r>
+                      <a:endParaRPr lang="en-US" sz="1600" dirty="0">
+                        <a:effectLst/>
+                      </a:endParaRPr>
+                    </a:p>
+                    <a:p>
+                      <a:pPr marL="342900" lvl="0" indent="-342900">
+                        <a:lnSpc>
+                          <a:spcPct val="107000"/>
+                        </a:lnSpc>
+                        <a:spcAft>
+                          <a:spcPts val="0"/>
+                        </a:spcAft>
+                        <a:buFont typeface="Symbol" panose="05050102010706020507" pitchFamily="18" charset="2"/>
+                        <a:buChar char=""/>
+                        <a:tabLst>
+                          <a:tab pos="4312285" algn="r"/>
+                        </a:tabLst>
+                      </a:pPr>
+                      <a:r>
+                        <a:rPr lang="en-US" sz="1800" dirty="0">
+                          <a:effectLst/>
+                        </a:rPr>
+                        <a:t>The “BA Design Contest” event information must be available in the database.</a:t>
+                      </a:r>
+                      <a:endParaRPr lang="en-US" sz="1600" dirty="0">
+                        <a:effectLst/>
+                        <a:latin typeface="Arial" panose="020B0604020202020204" pitchFamily="34" charset="0"/>
+                        <a:ea typeface="Arial" panose="020B0604020202020204" pitchFamily="34" charset="0"/>
+                        <a:cs typeface="Times New Roman" panose="02020603050405020304" pitchFamily="18" charset="0"/>
+                      </a:endParaRPr>
+                    </a:p>
+                  </a:txBody>
+                  <a:tcPr marL="68580" marR="68580" marT="0" marB="0"/>
+                </a:tc>
+              </a:tr>
+              <a:tr h="616279">
+                <a:tc>
+                  <a:txBody>
+                    <a:bodyPr/>
+                    <a:lstStyle/>
+                    <a:p>
+                      <a:pPr>
+                        <a:lnSpc>
+                          <a:spcPct val="107000"/>
+                        </a:lnSpc>
+                        <a:spcAft>
+                          <a:spcPts val="0"/>
+                        </a:spcAft>
+                      </a:pPr>
+                      <a:r>
+                        <a:rPr lang="en-US" sz="1800">
+                          <a:effectLst/>
+                        </a:rPr>
+                        <a:t>Steps</a:t>
+                      </a:r>
+                      <a:endParaRPr lang="en-US" sz="1600">
+                        <a:effectLst/>
+                      </a:endParaRPr>
+                    </a:p>
+                    <a:p>
+                      <a:pPr>
+                        <a:lnSpc>
+                          <a:spcPct val="107000"/>
+                        </a:lnSpc>
+                        <a:spcAft>
+                          <a:spcPts val="0"/>
+                        </a:spcAft>
+                      </a:pPr>
+                      <a:r>
+                        <a:rPr lang="en-US" sz="1800">
+                          <a:effectLst/>
+                        </a:rPr>
+                        <a:t> </a:t>
+                      </a:r>
+                      <a:endParaRPr lang="en-US" sz="1600">
+                        <a:effectLst/>
+                        <a:latin typeface="Arial" panose="020B0604020202020204" pitchFamily="34" charset="0"/>
+                        <a:ea typeface="Arial" panose="020B0604020202020204" pitchFamily="34" charset="0"/>
+                        <a:cs typeface="Times New Roman" panose="02020603050405020304" pitchFamily="18" charset="0"/>
+                      </a:endParaRPr>
+                    </a:p>
+                  </a:txBody>
+                  <a:tcPr marL="68580" marR="68580" marT="0" marB="0"/>
+                </a:tc>
+                <a:tc>
+                  <a:txBody>
+                    <a:bodyPr/>
+                    <a:lstStyle/>
+                    <a:p>
+                      <a:pPr>
+                        <a:lnSpc>
+                          <a:spcPct val="107000"/>
+                        </a:lnSpc>
+                        <a:spcAft>
+                          <a:spcPts val="0"/>
+                        </a:spcAft>
+                      </a:pPr>
+                      <a:r>
+                        <a:rPr lang="en-US" sz="1800" dirty="0">
+                          <a:effectLst/>
+                        </a:rPr>
+                        <a:t>Tap on the “BA Design Contest” event.</a:t>
+                      </a:r>
+                      <a:endParaRPr lang="en-US" sz="1600" dirty="0">
+                        <a:effectLst/>
+                        <a:latin typeface="Arial" panose="020B0604020202020204" pitchFamily="34" charset="0"/>
+                        <a:ea typeface="Arial" panose="020B0604020202020204" pitchFamily="34" charset="0"/>
+                        <a:cs typeface="Times New Roman" panose="02020603050405020304" pitchFamily="18" charset="0"/>
+                      </a:endParaRPr>
+                    </a:p>
+                  </a:txBody>
+                  <a:tcPr marL="68580" marR="68580" marT="0" marB="0"/>
+                </a:tc>
+              </a:tr>
+              <a:tr h="1879785">
+                <a:tc>
+                  <a:txBody>
+                    <a:bodyPr/>
+                    <a:lstStyle/>
+                    <a:p>
+                      <a:pPr>
+                        <a:lnSpc>
+                          <a:spcPct val="107000"/>
+                        </a:lnSpc>
+                        <a:spcAft>
+                          <a:spcPts val="0"/>
+                        </a:spcAft>
+                      </a:pPr>
+                      <a:r>
+                        <a:rPr lang="en-US" sz="1800">
+                          <a:effectLst/>
+                        </a:rPr>
+                        <a:t>Expected Results</a:t>
+                      </a:r>
+                      <a:endParaRPr lang="en-US" sz="1600">
+                        <a:effectLst/>
+                      </a:endParaRPr>
+                    </a:p>
+                    <a:p>
+                      <a:pPr>
+                        <a:lnSpc>
+                          <a:spcPct val="107000"/>
+                        </a:lnSpc>
+                        <a:spcAft>
+                          <a:spcPts val="0"/>
+                        </a:spcAft>
+                      </a:pPr>
+                      <a:r>
+                        <a:rPr lang="en-US" sz="1800">
+                          <a:effectLst/>
+                        </a:rPr>
+                        <a:t> </a:t>
+                      </a:r>
+                      <a:endParaRPr lang="en-US" sz="1600">
+                        <a:effectLst/>
+                        <a:latin typeface="Arial" panose="020B0604020202020204" pitchFamily="34" charset="0"/>
+                        <a:ea typeface="Arial" panose="020B0604020202020204" pitchFamily="34" charset="0"/>
+                        <a:cs typeface="Times New Roman" panose="02020603050405020304" pitchFamily="18" charset="0"/>
+                      </a:endParaRPr>
+                    </a:p>
+                  </a:txBody>
+                  <a:tcPr marL="68580" marR="68580" marT="0" marB="0"/>
+                </a:tc>
+                <a:tc>
+                  <a:txBody>
+                    <a:bodyPr/>
+                    <a:lstStyle/>
+                    <a:p>
+                      <a:pPr marL="342900" lvl="0" indent="-342900">
+                        <a:lnSpc>
+                          <a:spcPct val="107000"/>
+                        </a:lnSpc>
+                        <a:spcAft>
+                          <a:spcPts val="0"/>
+                        </a:spcAft>
+                        <a:buFont typeface="+mj-lt"/>
+                        <a:buAutoNum type="arabicPeriod"/>
+                      </a:pPr>
+                      <a:r>
+                        <a:rPr lang="en-US" sz="1800" dirty="0">
+                          <a:effectLst/>
+                        </a:rPr>
+                        <a:t>The detailed information windows displays.</a:t>
+                      </a:r>
+                      <a:endParaRPr lang="en-US" sz="1600" dirty="0">
+                        <a:effectLst/>
+                      </a:endParaRPr>
+                    </a:p>
+                    <a:p>
+                      <a:pPr marL="342900" lvl="0" indent="-342900">
+                        <a:lnSpc>
+                          <a:spcPct val="107000"/>
+                        </a:lnSpc>
+                        <a:spcAft>
+                          <a:spcPts val="0"/>
+                        </a:spcAft>
+                        <a:buFont typeface="+mj-lt"/>
+                        <a:buAutoNum type="arabicPeriod"/>
+                      </a:pPr>
+                      <a:r>
+                        <a:rPr lang="en-US" sz="1800" dirty="0">
+                          <a:effectLst/>
+                        </a:rPr>
+                        <a:t> The “Description” field content is “Give your ideas to design the uniform and BA logo”.</a:t>
+                      </a:r>
+                      <a:endParaRPr lang="en-US" sz="1600" dirty="0">
+                        <a:effectLst/>
+                      </a:endParaRPr>
+                    </a:p>
+                    <a:p>
+                      <a:pPr marL="342900" lvl="0" indent="-342900">
+                        <a:lnSpc>
+                          <a:spcPct val="107000"/>
+                        </a:lnSpc>
+                        <a:spcAft>
+                          <a:spcPts val="0"/>
+                        </a:spcAft>
+                        <a:buFont typeface="+mj-lt"/>
+                        <a:buAutoNum type="arabicPeriod"/>
+                      </a:pPr>
+                      <a:r>
+                        <a:rPr lang="en-US" sz="1800" dirty="0">
+                          <a:effectLst/>
+                        </a:rPr>
+                        <a:t>The “Date” field content is “Wednesday, 17-04-2013”.</a:t>
+                      </a:r>
+                      <a:endParaRPr lang="en-US" sz="1600" dirty="0">
+                        <a:effectLst/>
+                      </a:endParaRPr>
+                    </a:p>
+                    <a:p>
+                      <a:pPr marL="342900" lvl="0" indent="-342900">
+                        <a:lnSpc>
+                          <a:spcPct val="107000"/>
+                        </a:lnSpc>
+                        <a:spcAft>
+                          <a:spcPts val="0"/>
+                        </a:spcAft>
+                        <a:buFont typeface="+mj-lt"/>
+                        <a:buAutoNum type="arabicPeriod"/>
+                      </a:pPr>
+                      <a:r>
+                        <a:rPr lang="en-US" sz="1800" dirty="0">
+                          <a:effectLst/>
+                        </a:rPr>
+                        <a:t>The “Time” field content is “08:00”.</a:t>
+                      </a:r>
+                      <a:endParaRPr lang="en-US" sz="1600" dirty="0">
+                        <a:effectLst/>
+                      </a:endParaRPr>
+                    </a:p>
+                    <a:p>
+                      <a:pPr marL="342900" lvl="0" indent="-342900">
+                        <a:lnSpc>
+                          <a:spcPct val="107000"/>
+                        </a:lnSpc>
+                        <a:spcAft>
+                          <a:spcPts val="0"/>
+                        </a:spcAft>
+                        <a:buFont typeface="+mj-lt"/>
+                        <a:buAutoNum type="arabicPeriod"/>
+                      </a:pPr>
+                      <a:r>
+                        <a:rPr lang="en-US" sz="1800" dirty="0">
+                          <a:effectLst/>
+                        </a:rPr>
+                        <a:t>The “Location” field does not have anything.</a:t>
+                      </a:r>
+                      <a:endParaRPr lang="en-US" sz="1600" dirty="0">
+                        <a:effectLst/>
+                        <a:latin typeface="Arial" panose="020B0604020202020204" pitchFamily="34" charset="0"/>
+                        <a:ea typeface="Arial" panose="020B0604020202020204" pitchFamily="34" charset="0"/>
+                        <a:cs typeface="Times New Roman" panose="02020603050405020304" pitchFamily="18" charset="0"/>
+                      </a:endParaRPr>
+                    </a:p>
+                  </a:txBody>
+                  <a:tcPr marL="68580" marR="68580" marT="0" marB="0"/>
+                </a:tc>
+              </a:tr>
+            </a:tbl>
+          </a:graphicData>
+        </a:graphic>
+      </p:graphicFrame>
+    </p:spTree>
+    <p:extLst>
+      <p:ext uri="{BB962C8B-B14F-4D97-AF65-F5344CB8AC3E}">
+        <p14:creationId xmlns:p14="http://schemas.microsoft.com/office/powerpoint/2010/main" val="2909602780"/>
+      </p:ext>
+    </p:extLst>
+  </p:cSld>
+  <p:clrMapOvr>
+    <a:masterClrMapping/>
+  </p:clrMapOvr>
+  <mc:AlternateContent xmlns:mc="http://schemas.openxmlformats.org/markup-compatibility/2006">
+    <mc:Choice xmlns:p14="http://schemas.microsoft.com/office/powerpoint/2010/main" Requires="p14">
+      <p:transition spd="med" p14:dur="700">
+        <p:fade/>
+      </p:transition>
+    </mc:Choice>
+    <mc:Fallback>
+      <p:transition spd="med">
+        <p:fade/>
+      </p:transition>
+    </mc:Fallback>
+  </mc:AlternateContent>
+</p:sld>
+</file>
+
+<file path=ppt/slides/slide19.xml><?xml version="1.0" encoding="utf-8"?>
+<p:sld xmlns:a="http://schemas.openxmlformats.org/drawingml/2006/main" xmlns:r="http://schemas.openxmlformats.org/officeDocument/2006/relationships" xmlns:p="http://schemas.openxmlformats.org/presentationml/2006/main">
+  <p:cSld>
+    <p:spTree>
+      <p:nvGrpSpPr>
+        <p:cNvPr id="1" name=""/>
+        <p:cNvGrpSpPr/>
+        <p:nvPr/>
+      </p:nvGrpSpPr>
+      <p:grpSpPr>
+        <a:xfrm>
+          <a:off x="0" y="0"/>
+          <a:ext cx="0" cy="0"/>
+          <a:chOff x="0" y="0"/>
+          <a:chExt cx="0" cy="0"/>
+        </a:xfrm>
+      </p:grpSpPr>
+      <p:sp>
+        <p:nvSpPr>
+          <p:cNvPr id="3" name="Title 2"/>
+          <p:cNvSpPr>
+            <a:spLocks noGrp="1"/>
+          </p:cNvSpPr>
+          <p:nvPr>
+            <p:ph type="title"/>
+          </p:nvPr>
+        </p:nvSpPr>
+        <p:spPr/>
+        <p:txBody>
+          <a:bodyPr/>
+          <a:lstStyle/>
+          <a:p>
+            <a:r>
+              <a:rPr lang="en-US" dirty="0" smtClean="0"/>
+              <a:t>Junit Java source code</a:t>
+            </a:r>
+            <a:endParaRPr lang="en-US" dirty="0"/>
+          </a:p>
+        </p:txBody>
+      </p:sp>
+      <p:pic>
+        <p:nvPicPr>
+          <p:cNvPr id="4" name="Content Placeholder 3"/>
+          <p:cNvPicPr>
+            <a:picLocks noGrp="1"/>
+          </p:cNvPicPr>
+          <p:nvPr>
+            <p:ph idx="1"/>
+          </p:nvPr>
+        </p:nvPicPr>
+        <p:blipFill>
+          <a:blip r:embed="rId2"/>
+          <a:stretch>
+            <a:fillRect/>
+          </a:stretch>
+        </p:blipFill>
+        <p:spPr>
+          <a:xfrm>
+            <a:off x="2797386" y="1828799"/>
+            <a:ext cx="5618645" cy="4438835"/>
+          </a:xfrm>
+          <a:prstGeom prst="rect">
+            <a:avLst/>
+          </a:prstGeom>
+        </p:spPr>
+      </p:pic>
+    </p:spTree>
+    <p:extLst>
+      <p:ext uri="{BB962C8B-B14F-4D97-AF65-F5344CB8AC3E}">
+        <p14:creationId xmlns:p14="http://schemas.microsoft.com/office/powerpoint/2010/main" val="3500234570"/>
+      </p:ext>
+    </p:extLst>
+  </p:cSld>
+  <p:clrMapOvr>
+    <a:masterClrMapping/>
+  </p:clrMapOvr>
+  <mc:AlternateContent xmlns:mc="http://schemas.openxmlformats.org/markup-compatibility/2006">
+    <mc:Choice xmlns:p14="http://schemas.microsoft.com/office/powerpoint/2010/main" Requires="p14">
+      <p:transition spd="med" p14:dur="700">
+        <p:fade/>
+      </p:transition>
+    </mc:Choice>
+    <mc:Fallback>
+      <p:transition spd="med">
+        <p:fade/>
+      </p:transition>
+    </mc:Fallback>
+  </mc:AlternateContent>
 </p:sld>
 </file>
 
@@ -9662,7 +10307,7 @@
         <p:spPr/>
         <p:txBody>
           <a:bodyPr numCol="1">
-            <a:normAutofit fontScale="85000" lnSpcReduction="20000"/>
+            <a:normAutofit fontScale="92500" lnSpcReduction="10000"/>
           </a:bodyPr>
           <a:lstStyle/>
           <a:p>
@@ -9702,7 +10347,6 @@
               <a:rPr lang="en-US" dirty="0" smtClean="0"/>
               <a:t>nformation use case</a:t>
             </a:r>
-            <a:endParaRPr lang="en-US" dirty="0" smtClean="0"/>
           </a:p>
           <a:p>
             <a:pPr marL="719138" lvl="1" indent="-354013">
@@ -9713,7 +10357,6 @@
               <a:rPr lang="en-US" dirty="0" smtClean="0"/>
               <a:t>Creating course announcements use case</a:t>
             </a:r>
-            <a:endParaRPr lang="en-US" dirty="0" smtClean="0"/>
           </a:p>
           <a:p>
             <a:pPr marL="560070" indent="-514350">
@@ -9734,7 +10377,6 @@
               <a:rPr lang="en-US" dirty="0" smtClean="0"/>
               <a:t>Version control</a:t>
             </a:r>
-            <a:endParaRPr lang="en-US" dirty="0" smtClean="0"/>
           </a:p>
           <a:p>
             <a:pPr marL="708660" lvl="1" indent="-342900">
@@ -9745,7 +10387,20 @@
               <a:rPr lang="en-US" dirty="0" smtClean="0"/>
               <a:t>Sample Java source with refactoring</a:t>
             </a:r>
-            <a:endParaRPr lang="en-US" dirty="0" smtClean="0"/>
+          </a:p>
+          <a:p>
+            <a:pPr marL="560070" indent="-514350">
+              <a:buFont typeface="+mj-lt"/>
+              <a:buAutoNum type="romanUcPeriod"/>
+            </a:pPr>
+            <a:r>
+              <a:rPr lang="en-US" dirty="0" smtClean="0"/>
+              <a:t>Test </a:t>
+            </a:r>
+            <a:r>
+              <a:rPr lang="en-US" dirty="0" smtClean="0"/>
+              <a:t>Note</a:t>
+            </a:r>
           </a:p>
           <a:p>
             <a:pPr marL="708660" lvl="1" indent="-342900">
@@ -9753,8 +10408,8 @@
               <a:buAutoNum type="arabicPeriod"/>
             </a:pPr>
             <a:r>
-              <a:rPr lang="en-US" dirty="0" smtClean="0"/>
-              <a:t>Sample Java source</a:t>
+              <a:rPr lang="en-US" dirty="0"/>
+              <a:t>Test case</a:t>
             </a:r>
           </a:p>
           <a:p>
@@ -9763,8 +10418,16 @@
               <a:buAutoNum type="arabicPeriod"/>
             </a:pPr>
             <a:r>
+              <a:rPr lang="en-US" dirty="0" err="1"/>
+              <a:t>JUnit</a:t>
+            </a:r>
+            <a:r>
+              <a:rPr lang="en-US" dirty="0"/>
+              <a:t> test java </a:t>
+            </a:r>
+            <a:r>
               <a:rPr lang="en-US" dirty="0" smtClean="0"/>
-              <a:t>Sample Java test source </a:t>
+              <a:t>source</a:t>
             </a:r>
           </a:p>
           <a:p>
@@ -9774,44 +10437,8 @@
             </a:pPr>
             <a:r>
               <a:rPr lang="en-US" dirty="0" smtClean="0"/>
-              <a:t>Test Note</a:t>
-            </a:r>
-          </a:p>
-          <a:p>
-            <a:pPr marL="708660" lvl="1" indent="-342900">
-              <a:buFont typeface="+mj-lt"/>
-              <a:buAutoNum type="arabicPeriod"/>
-            </a:pPr>
-            <a:r>
-              <a:rPr lang="en-US" dirty="0"/>
-              <a:t>Test case</a:t>
-            </a:r>
-          </a:p>
-          <a:p>
-            <a:pPr marL="708660" lvl="1" indent="-342900">
-              <a:buFont typeface="+mj-lt"/>
-              <a:buAutoNum type="arabicPeriod"/>
-            </a:pPr>
-            <a:r>
-              <a:rPr lang="en-US" dirty="0"/>
-              <a:t>JUnit test java </a:t>
-            </a:r>
-            <a:r>
-              <a:rPr lang="en-US" dirty="0" smtClean="0"/>
-              <a:t>source</a:t>
-            </a:r>
-            <a:endParaRPr lang="en-US" dirty="0" smtClean="0"/>
-          </a:p>
-          <a:p>
-            <a:pPr marL="560070" indent="-514350">
-              <a:buFont typeface="+mj-lt"/>
-              <a:buAutoNum type="romanUcPeriod"/>
-            </a:pPr>
-            <a:r>
-              <a:rPr lang="en-US" dirty="0" smtClean="0"/>
               <a:t>Demo</a:t>
             </a:r>
-            <a:endParaRPr lang="en-US" dirty="0" smtClean="0"/>
           </a:p>
           <a:p>
             <a:pPr marL="365760" lvl="1" indent="0">
@@ -9885,13 +10512,92 @@
   <p:clrMapOvr>
     <a:masterClrMapping/>
   </p:clrMapOvr>
-  <mc:AlternateContent xmlns:mc="http://schemas.openxmlformats.org/markup-compatibility/2006">
-    <mc:Choice xmlns:p14="http://schemas.microsoft.com/office/powerpoint/2010/main" Requires="p14">
+  <mc:AlternateContent xmlns:mc="http://schemas.openxmlformats.org/markup-compatibility/2006" xmlns:p14="http://schemas.microsoft.com/office/powerpoint/2010/main">
+    <mc:Choice Requires="p14">
       <p:transition spd="med" p14:dur="700">
         <p:fade/>
       </p:transition>
     </mc:Choice>
-    <mc:Fallback>
+    <mc:Fallback xmlns="">
+      <p:transition spd="med">
+        <p:fade/>
+      </p:transition>
+    </mc:Fallback>
+  </mc:AlternateContent>
+  <p:timing>
+    <p:tnLst>
+      <p:par>
+        <p:cTn id="1" dur="indefinite" restart="never" nodeType="tmRoot"/>
+      </p:par>
+    </p:tnLst>
+  </p:timing>
+</p:sld>
+</file>
+
+<file path=ppt/slides/slide20.xml><?xml version="1.0" encoding="utf-8"?>
+<p:sld xmlns:a="http://schemas.openxmlformats.org/drawingml/2006/main" xmlns:r="http://schemas.openxmlformats.org/officeDocument/2006/relationships" xmlns:p="http://schemas.openxmlformats.org/presentationml/2006/main">
+  <p:cSld>
+    <p:spTree>
+      <p:nvGrpSpPr>
+        <p:cNvPr id="1" name=""/>
+        <p:cNvGrpSpPr/>
+        <p:nvPr/>
+      </p:nvGrpSpPr>
+      <p:grpSpPr>
+        <a:xfrm>
+          <a:off x="0" y="0"/>
+          <a:ext cx="0" cy="0"/>
+          <a:chOff x="0" y="0"/>
+          <a:chExt cx="0" cy="0"/>
+        </a:xfrm>
+      </p:grpSpPr>
+      <p:sp>
+        <p:nvSpPr>
+          <p:cNvPr id="3" name="Title 2"/>
+          <p:cNvSpPr>
+            <a:spLocks noGrp="1"/>
+          </p:cNvSpPr>
+          <p:nvPr>
+            <p:ph type="title"/>
+          </p:nvPr>
+        </p:nvSpPr>
+        <p:spPr>
+          <a:xfrm>
+            <a:off x="2279577" y="2492896"/>
+            <a:ext cx="8686801" cy="1066800"/>
+          </a:xfrm>
+        </p:spPr>
+        <p:txBody>
+          <a:bodyPr>
+            <a:normAutofit/>
+          </a:bodyPr>
+          <a:lstStyle/>
+          <a:p>
+            <a:r>
+              <a:rPr lang="en-US" sz="4800" smtClean="0"/>
+              <a:t>Demo</a:t>
+            </a:r>
+            <a:endParaRPr lang="vi-VN" sz="4800" dirty="0"/>
+          </a:p>
+        </p:txBody>
+      </p:sp>
+    </p:spTree>
+    <p:extLst>
+      <p:ext uri="{BB962C8B-B14F-4D97-AF65-F5344CB8AC3E}">
+        <p14:creationId xmlns:p14="http://schemas.microsoft.com/office/powerpoint/2010/main" val="589343847"/>
+      </p:ext>
+    </p:extLst>
+  </p:cSld>
+  <p:clrMapOvr>
+    <a:masterClrMapping/>
+  </p:clrMapOvr>
+  <mc:AlternateContent xmlns:mc="http://schemas.openxmlformats.org/markup-compatibility/2006" xmlns:p14="http://schemas.microsoft.com/office/powerpoint/2010/main">
+    <mc:Choice Requires="p14">
+      <p:transition spd="med" p14:dur="700">
+        <p:fade/>
+      </p:transition>
+    </mc:Choice>
+    <mc:Fallback xmlns="">
       <p:transition spd="med">
         <p:fade/>
       </p:transition>
@@ -9964,13 +10670,13 @@
   <p:clrMapOvr>
     <a:masterClrMapping/>
   </p:clrMapOvr>
-  <mc:AlternateContent xmlns:mc="http://schemas.openxmlformats.org/markup-compatibility/2006">
-    <mc:Choice xmlns:p14="http://schemas.microsoft.com/office/powerpoint/2010/main" Requires="p14">
+  <mc:AlternateContent xmlns:mc="http://schemas.openxmlformats.org/markup-compatibility/2006" xmlns:p14="http://schemas.microsoft.com/office/powerpoint/2010/main">
+    <mc:Choice Requires="p14">
       <p:transition spd="med" p14:dur="700">
         <p:fade/>
       </p:transition>
     </mc:Choice>
-    <mc:Fallback>
+    <mc:Fallback xmlns="">
       <p:transition spd="med">
         <p:fade/>
       </p:transition>
@@ -10065,13 +10771,13 @@
   <p:clrMapOvr>
     <a:masterClrMapping/>
   </p:clrMapOvr>
-  <mc:AlternateContent xmlns:mc="http://schemas.openxmlformats.org/markup-compatibility/2006">
-    <mc:Choice xmlns:p14="http://schemas.microsoft.com/office/powerpoint/2010/main" Requires="p14">
+  <mc:AlternateContent xmlns:mc="http://schemas.openxmlformats.org/markup-compatibility/2006" xmlns:p14="http://schemas.microsoft.com/office/powerpoint/2010/main">
+    <mc:Choice Requires="p14">
       <p:transition spd="med" p14:dur="700">
         <p:fade/>
       </p:transition>
     </mc:Choice>
-    <mc:Fallback>
+    <mc:Fallback xmlns="">
       <p:transition spd="med">
         <p:fade/>
       </p:transition>
@@ -10183,13 +10889,13 @@
   <p:clrMapOvr>
     <a:masterClrMapping/>
   </p:clrMapOvr>
-  <mc:AlternateContent xmlns:mc="http://schemas.openxmlformats.org/markup-compatibility/2006">
-    <mc:Choice xmlns:p14="http://schemas.microsoft.com/office/powerpoint/2010/main" Requires="p14">
+  <mc:AlternateContent xmlns:mc="http://schemas.openxmlformats.org/markup-compatibility/2006" xmlns:p14="http://schemas.microsoft.com/office/powerpoint/2010/main">
+    <mc:Choice Requires="p14">
       <p:transition spd="med" p14:dur="700">
         <p:fade/>
       </p:transition>
     </mc:Choice>
-    <mc:Fallback>
+    <mc:Fallback xmlns="">
       <p:transition spd="med">
         <p:fade/>
       </p:transition>
@@ -10301,13 +11007,13 @@
   <p:clrMapOvr>
     <a:masterClrMapping/>
   </p:clrMapOvr>
-  <mc:AlternateContent xmlns:mc="http://schemas.openxmlformats.org/markup-compatibility/2006">
-    <mc:Choice xmlns:p14="http://schemas.microsoft.com/office/powerpoint/2010/main" Requires="p14">
+  <mc:AlternateContent xmlns:mc="http://schemas.openxmlformats.org/markup-compatibility/2006" xmlns:p14="http://schemas.microsoft.com/office/powerpoint/2010/main">
+    <mc:Choice Requires="p14">
       <p:transition spd="med" p14:dur="700">
         <p:fade/>
       </p:transition>
     </mc:Choice>
-    <mc:Fallback>
+    <mc:Fallback xmlns="">
       <p:transition spd="med">
         <p:fade/>
       </p:transition>
@@ -10380,13 +11086,13 @@
   <p:clrMapOvr>
     <a:masterClrMapping/>
   </p:clrMapOvr>
-  <mc:AlternateContent xmlns:mc="http://schemas.openxmlformats.org/markup-compatibility/2006">
-    <mc:Choice xmlns:p14="http://schemas.microsoft.com/office/powerpoint/2010/main" Requires="p14">
+  <mc:AlternateContent xmlns:mc="http://schemas.openxmlformats.org/markup-compatibility/2006" xmlns:p14="http://schemas.microsoft.com/office/powerpoint/2010/main">
+    <mc:Choice Requires="p14">
       <p:transition spd="med" p14:dur="700">
         <p:fade/>
       </p:transition>
     </mc:Choice>
-    <mc:Fallback>
+    <mc:Fallback xmlns="">
       <p:transition spd="med">
         <p:fade/>
       </p:transition>
@@ -10497,13 +11203,13 @@
   <p:clrMapOvr>
     <a:masterClrMapping/>
   </p:clrMapOvr>
-  <mc:AlternateContent xmlns:mc="http://schemas.openxmlformats.org/markup-compatibility/2006">
-    <mc:Choice xmlns:p14="http://schemas.microsoft.com/office/powerpoint/2010/main" Requires="p14">
+  <mc:AlternateContent xmlns:mc="http://schemas.openxmlformats.org/markup-compatibility/2006" xmlns:p14="http://schemas.microsoft.com/office/powerpoint/2010/main">
+    <mc:Choice Requires="p14">
       <p:transition spd="med" p14:dur="700">
         <p:fade/>
       </p:transition>
     </mc:Choice>
-    <mc:Fallback>
+    <mc:Fallback xmlns="">
       <p:transition spd="med">
         <p:fade/>
       </p:transition>
@@ -10596,13 +11302,13 @@
   <p:clrMapOvr>
     <a:masterClrMapping/>
   </p:clrMapOvr>
-  <mc:AlternateContent xmlns:mc="http://schemas.openxmlformats.org/markup-compatibility/2006">
-    <mc:Choice xmlns:p14="http://schemas.microsoft.com/office/powerpoint/2010/main" Requires="p14">
+  <mc:AlternateContent xmlns:mc="http://schemas.openxmlformats.org/markup-compatibility/2006" xmlns:p14="http://schemas.microsoft.com/office/powerpoint/2010/main">
+    <mc:Choice Requires="p14">
       <p:transition spd="med" p14:dur="700">
         <p:fade/>
       </p:transition>
     </mc:Choice>
-    <mc:Fallback>
+    <mc:Fallback xmlns="">
       <p:transition spd="med">
         <p:fade/>
       </p:transition>

</xml_diff>